<commit_message>
added rq1 into the screncast pptx
</commit_message>
<xml_diff>
--- a/Screencast_Presentation.pptx
+++ b/Screencast_Presentation.pptx
@@ -344,7 +344,7 @@
             <a:fld id="{5586B75A-687E-405C-8A0B-8D00578BA2C3}" type="datetimeFigureOut">
               <a:rPr lang="en-US" smtClean="0"/>
               <a:pPr/>
-              <a:t>12/21/2018</a:t>
+              <a:t>1/5/2019</a:t>
             </a:fld>
             <a:endParaRPr lang="en-US" dirty="0"/>
           </a:p>
@@ -516,7 +516,7 @@
             <a:fld id="{5586B75A-687E-405C-8A0B-8D00578BA2C3}" type="datetimeFigureOut">
               <a:rPr lang="en-US" smtClean="0"/>
               <a:pPr/>
-              <a:t>12/21/2018</a:t>
+              <a:t>1/5/2019</a:t>
             </a:fld>
             <a:endParaRPr lang="en-US" dirty="0"/>
           </a:p>
@@ -698,7 +698,7 @@
             <a:fld id="{5586B75A-687E-405C-8A0B-8D00578BA2C3}" type="datetimeFigureOut">
               <a:rPr lang="en-US" smtClean="0"/>
               <a:pPr/>
-              <a:t>12/21/2018</a:t>
+              <a:t>1/5/2019</a:t>
             </a:fld>
             <a:endParaRPr lang="en-US" dirty="0"/>
           </a:p>
@@ -870,7 +870,7 @@
             <a:fld id="{5586B75A-687E-405C-8A0B-8D00578BA2C3}" type="datetimeFigureOut">
               <a:rPr lang="en-US" smtClean="0"/>
               <a:pPr/>
-              <a:t>12/21/2018</a:t>
+              <a:t>1/5/2019</a:t>
             </a:fld>
             <a:endParaRPr lang="en-US" dirty="0"/>
           </a:p>
@@ -1126,7 +1126,7 @@
             <a:fld id="{5586B75A-687E-405C-8A0B-8D00578BA2C3}" type="datetimeFigureOut">
               <a:rPr lang="en-US" smtClean="0"/>
               <a:pPr/>
-              <a:t>12/21/2018</a:t>
+              <a:t>1/5/2019</a:t>
             </a:fld>
             <a:endParaRPr lang="en-US" dirty="0"/>
           </a:p>
@@ -1416,7 +1416,7 @@
             <a:fld id="{5586B75A-687E-405C-8A0B-8D00578BA2C3}" type="datetimeFigureOut">
               <a:rPr lang="en-US" smtClean="0"/>
               <a:pPr/>
-              <a:t>12/21/2018</a:t>
+              <a:t>1/5/2019</a:t>
             </a:fld>
             <a:endParaRPr lang="en-US" dirty="0"/>
           </a:p>
@@ -1860,7 +1860,7 @@
             <a:fld id="{5586B75A-687E-405C-8A0B-8D00578BA2C3}" type="datetimeFigureOut">
               <a:rPr lang="en-US" smtClean="0"/>
               <a:pPr/>
-              <a:t>12/21/2018</a:t>
+              <a:t>1/5/2019</a:t>
             </a:fld>
             <a:endParaRPr lang="en-US" dirty="0"/>
           </a:p>
@@ -1980,7 +1980,7 @@
             <a:fld id="{5586B75A-687E-405C-8A0B-8D00578BA2C3}" type="datetimeFigureOut">
               <a:rPr lang="en-US" smtClean="0"/>
               <a:pPr/>
-              <a:t>12/21/2018</a:t>
+              <a:t>1/5/2019</a:t>
             </a:fld>
             <a:endParaRPr lang="en-US" dirty="0"/>
           </a:p>
@@ -2077,7 +2077,7 @@
             <a:fld id="{5586B75A-687E-405C-8A0B-8D00578BA2C3}" type="datetimeFigureOut">
               <a:rPr lang="en-US" smtClean="0"/>
               <a:pPr/>
-              <a:t>12/21/2018</a:t>
+              <a:t>1/5/2019</a:t>
             </a:fld>
             <a:endParaRPr lang="en-US" dirty="0"/>
           </a:p>
@@ -2367,7 +2367,7 @@
             <a:fld id="{5586B75A-687E-405C-8A0B-8D00578BA2C3}" type="datetimeFigureOut">
               <a:rPr lang="en-US" smtClean="0"/>
               <a:pPr/>
-              <a:t>12/21/2018</a:t>
+              <a:t>1/5/2019</a:t>
             </a:fld>
             <a:endParaRPr lang="en-US" dirty="0"/>
           </a:p>
@@ -2421,7 +2421,7 @@
           <p:cNvPr id="11" name="Content Placeholder 2">
             <a:extLst>
               <a:ext uri="{FF2B5EF4-FFF2-40B4-BE49-F238E27FC236}">
-                <a16:creationId xmlns:a16="http://schemas.microsoft.com/office/drawing/2014/main" id="{87B0DF2F-DAFD-4616-9E25-0C28D75BF306}"/>
+                <a16:creationId xmlns:a16="http://schemas.microsoft.com/office/drawing/2014/main" xmlns="" id="{87B0DF2F-DAFD-4616-9E25-0C28D75BF306}"/>
               </a:ext>
             </a:extLst>
           </p:cNvPr>
@@ -2512,7 +2512,7 @@
           <p:cNvPr id="12" name="Content Placeholder 2">
             <a:extLst>
               <a:ext uri="{FF2B5EF4-FFF2-40B4-BE49-F238E27FC236}">
-                <a16:creationId xmlns:a16="http://schemas.microsoft.com/office/drawing/2014/main" id="{336DA0F9-D851-437C-A45B-EC125A3D3DB3}"/>
+                <a16:creationId xmlns:a16="http://schemas.microsoft.com/office/drawing/2014/main" xmlns="" id="{336DA0F9-D851-437C-A45B-EC125A3D3DB3}"/>
               </a:ext>
             </a:extLst>
           </p:cNvPr>
@@ -2603,7 +2603,7 @@
           <p:cNvPr id="6" name="Text Placeholder 5">
             <a:extLst>
               <a:ext uri="{FF2B5EF4-FFF2-40B4-BE49-F238E27FC236}">
-                <a16:creationId xmlns:a16="http://schemas.microsoft.com/office/drawing/2014/main" id="{0FF0BA98-3AB4-4D88-B1C2-6279BCACFAD9}"/>
+                <a16:creationId xmlns:a16="http://schemas.microsoft.com/office/drawing/2014/main" xmlns="" id="{0FF0BA98-3AB4-4D88-B1C2-6279BCACFAD9}"/>
               </a:ext>
             </a:extLst>
           </p:cNvPr>
@@ -2665,7 +2665,7 @@
           <p:cNvPr id="13" name="Text Placeholder 5">
             <a:extLst>
               <a:ext uri="{FF2B5EF4-FFF2-40B4-BE49-F238E27FC236}">
-                <a16:creationId xmlns:a16="http://schemas.microsoft.com/office/drawing/2014/main" id="{D9DEF72B-B924-4A0D-8C83-3B370632C0D3}"/>
+                <a16:creationId xmlns:a16="http://schemas.microsoft.com/office/drawing/2014/main" xmlns="" id="{D9DEF72B-B924-4A0D-8C83-3B370632C0D3}"/>
               </a:ext>
             </a:extLst>
           </p:cNvPr>
@@ -2728,7 +2728,7 @@
           <p:cNvPr id="14" name="Text Placeholder 5">
             <a:extLst>
               <a:ext uri="{FF2B5EF4-FFF2-40B4-BE49-F238E27FC236}">
-                <a16:creationId xmlns:a16="http://schemas.microsoft.com/office/drawing/2014/main" id="{E9D30C54-E9E8-4300-8DA4-352DB3A71A4F}"/>
+                <a16:creationId xmlns:a16="http://schemas.microsoft.com/office/drawing/2014/main" xmlns="" id="{E9D30C54-E9E8-4300-8DA4-352DB3A71A4F}"/>
               </a:ext>
             </a:extLst>
           </p:cNvPr>
@@ -3011,7 +3011,7 @@
             <a:fld id="{5586B75A-687E-405C-8A0B-8D00578BA2C3}" type="datetimeFigureOut">
               <a:rPr lang="en-US" smtClean="0"/>
               <a:pPr/>
-              <a:t>12/21/2018</a:t>
+              <a:t>1/5/2019</a:t>
             </a:fld>
             <a:endParaRPr lang="en-US" dirty="0"/>
           </a:p>
@@ -3310,7 +3310,7 @@
             <a:fld id="{5586B75A-687E-405C-8A0B-8D00578BA2C3}" type="datetimeFigureOut">
               <a:rPr lang="en-US" smtClean="0"/>
               <a:pPr/>
-              <a:t>12/21/2018</a:t>
+              <a:t>1/5/2019</a:t>
             </a:fld>
             <a:endParaRPr lang="en-US" dirty="0"/>
           </a:p>
@@ -3799,10 +3799,10 @@
           <p:cNvPr id="10" name="Rectangle 9">
             <a:extLst>
               <a:ext uri="{FF2B5EF4-FFF2-40B4-BE49-F238E27FC236}">
-                <a16:creationId xmlns:a16="http://schemas.microsoft.com/office/drawing/2014/main" id="{8869841E-71E7-4F51-8E6F-5E8A5E375653}"/>
+                <a16:creationId xmlns:a16="http://schemas.microsoft.com/office/drawing/2014/main" xmlns="" id="{8869841E-71E7-4F51-8E6F-5E8A5E375653}"/>
               </a:ext>
               <a:ext uri="{C183D7F6-B498-43B3-948B-1728B52AA6E4}">
-                <adec:decorative xmlns:adec="http://schemas.microsoft.com/office/drawing/2017/decorative" val="1"/>
+                <adec:decorative xmlns:adec="http://schemas.microsoft.com/office/drawing/2017/decorative" xmlns="" val="1"/>
               </a:ext>
             </a:extLst>
           </p:cNvPr>
@@ -3812,7 +3812,7 @@
           <p:nvPr>
             <p:extLst>
               <p:ext uri="{386F3935-93C4-4BCD-93E2-E3B085C9AB24}">
-                <p16:designElem xmlns:p16="http://schemas.microsoft.com/office/powerpoint/2015/main" val="1"/>
+                <p16:designElem xmlns:p16="http://schemas.microsoft.com/office/powerpoint/2015/main" xmlns="" val="1"/>
               </p:ext>
             </p:extLst>
           </p:nvPr>
@@ -3859,7 +3859,7 @@
           <p:cNvPr id="5" name="Picture 4">
             <a:extLst>
               <a:ext uri="{FF2B5EF4-FFF2-40B4-BE49-F238E27FC236}">
-                <a16:creationId xmlns:a16="http://schemas.microsoft.com/office/drawing/2014/main" id="{A3A2E0DA-DA21-447D-AD1F-3DB915DD051B}"/>
+                <a16:creationId xmlns:a16="http://schemas.microsoft.com/office/drawing/2014/main" xmlns="" id="{A3A2E0DA-DA21-447D-AD1F-3DB915DD051B}"/>
               </a:ext>
             </a:extLst>
           </p:cNvPr>
@@ -3895,10 +3895,10 @@
           <p:cNvPr id="12" name="Rectangle 11">
             <a:extLst>
               <a:ext uri="{FF2B5EF4-FFF2-40B4-BE49-F238E27FC236}">
-                <a16:creationId xmlns:a16="http://schemas.microsoft.com/office/drawing/2014/main" id="{594B067E-A161-4B29-A8FA-FEEB1944952A}"/>
+                <a16:creationId xmlns:a16="http://schemas.microsoft.com/office/drawing/2014/main" xmlns="" id="{594B067E-A161-4B29-A8FA-FEEB1944952A}"/>
               </a:ext>
               <a:ext uri="{C183D7F6-B498-43B3-948B-1728B52AA6E4}">
-                <adec:decorative xmlns:adec="http://schemas.microsoft.com/office/drawing/2017/decorative" val="1"/>
+                <adec:decorative xmlns:adec="http://schemas.microsoft.com/office/drawing/2017/decorative" xmlns="" val="1"/>
               </a:ext>
             </a:extLst>
           </p:cNvPr>
@@ -3908,7 +3908,7 @@
           <p:nvPr>
             <p:extLst>
               <p:ext uri="{386F3935-93C4-4BCD-93E2-E3B085C9AB24}">
-                <p16:designElem xmlns:p16="http://schemas.microsoft.com/office/powerpoint/2015/main" val="1"/>
+                <p16:designElem xmlns:p16="http://schemas.microsoft.com/office/powerpoint/2015/main" xmlns="" val="1"/>
               </p:ext>
             </p:extLst>
           </p:nvPr>
@@ -3950,7 +3950,7 @@
           <p:cNvPr id="2" name="Title 1">
             <a:extLst>
               <a:ext uri="{FF2B5EF4-FFF2-40B4-BE49-F238E27FC236}">
-                <a16:creationId xmlns:a16="http://schemas.microsoft.com/office/drawing/2014/main" id="{7D6CA50C-1A88-4B3F-A34F-FE199F4205A2}"/>
+                <a16:creationId xmlns:a16="http://schemas.microsoft.com/office/drawing/2014/main" xmlns="" id="{7D6CA50C-1A88-4B3F-A34F-FE199F4205A2}"/>
               </a:ext>
             </a:extLst>
           </p:cNvPr>
@@ -4023,10 +4023,10 @@
           <p:cNvPr id="10" name="Rectangle 9">
             <a:extLst>
               <a:ext uri="{FF2B5EF4-FFF2-40B4-BE49-F238E27FC236}">
-                <a16:creationId xmlns:a16="http://schemas.microsoft.com/office/drawing/2014/main" id="{DA178560-78C9-4CB5-BE46-05302CDA8E98}"/>
+                <a16:creationId xmlns:a16="http://schemas.microsoft.com/office/drawing/2014/main" xmlns="" id="{DA178560-78C9-4CB5-BE46-05302CDA8E98}"/>
               </a:ext>
               <a:ext uri="{C183D7F6-B498-43B3-948B-1728B52AA6E4}">
-                <adec:decorative xmlns:adec="http://schemas.microsoft.com/office/drawing/2017/decorative" val="1"/>
+                <adec:decorative xmlns:adec="http://schemas.microsoft.com/office/drawing/2017/decorative" xmlns="" val="1"/>
               </a:ext>
             </a:extLst>
           </p:cNvPr>
@@ -4036,7 +4036,7 @@
           <p:nvPr>
             <p:extLst>
               <p:ext uri="{386F3935-93C4-4BCD-93E2-E3B085C9AB24}">
-                <p16:designElem xmlns:p16="http://schemas.microsoft.com/office/powerpoint/2015/main" val="1"/>
+                <p16:designElem xmlns:p16="http://schemas.microsoft.com/office/powerpoint/2015/main" xmlns="" val="1"/>
               </p:ext>
             </p:extLst>
           </p:nvPr>
@@ -4083,7 +4083,7 @@
           <p:cNvPr id="5" name="Picture 4" descr="multiple people looking at blueprints&#10;">
             <a:extLst>
               <a:ext uri="{FF2B5EF4-FFF2-40B4-BE49-F238E27FC236}">
-                <a16:creationId xmlns:a16="http://schemas.microsoft.com/office/drawing/2014/main" id="{DC582F7A-0108-4267-A3E3-CA43CDA209C6}"/>
+                <a16:creationId xmlns:a16="http://schemas.microsoft.com/office/drawing/2014/main" xmlns="" id="{DC582F7A-0108-4267-A3E3-CA43CDA209C6}"/>
               </a:ext>
             </a:extLst>
           </p:cNvPr>
@@ -4112,10 +4112,10 @@
           <p:cNvPr id="12" name="Rectangle 11">
             <a:extLst>
               <a:ext uri="{FF2B5EF4-FFF2-40B4-BE49-F238E27FC236}">
-                <a16:creationId xmlns:a16="http://schemas.microsoft.com/office/drawing/2014/main" id="{69461EC9-A94F-4225-B526-5C862F340FB6}"/>
+                <a16:creationId xmlns:a16="http://schemas.microsoft.com/office/drawing/2014/main" xmlns="" id="{69461EC9-A94F-4225-B526-5C862F340FB6}"/>
               </a:ext>
               <a:ext uri="{C183D7F6-B498-43B3-948B-1728B52AA6E4}">
-                <adec:decorative xmlns:adec="http://schemas.microsoft.com/office/drawing/2017/decorative" val="1"/>
+                <adec:decorative xmlns:adec="http://schemas.microsoft.com/office/drawing/2017/decorative" xmlns="" val="1"/>
               </a:ext>
             </a:extLst>
           </p:cNvPr>
@@ -4125,7 +4125,7 @@
           <p:nvPr>
             <p:extLst>
               <p:ext uri="{386F3935-93C4-4BCD-93E2-E3B085C9AB24}">
-                <p16:designElem xmlns:p16="http://schemas.microsoft.com/office/powerpoint/2015/main" val="1"/>
+                <p16:designElem xmlns:p16="http://schemas.microsoft.com/office/powerpoint/2015/main" xmlns="" val="1"/>
               </p:ext>
             </p:extLst>
           </p:nvPr>
@@ -4167,7 +4167,7 @@
           <p:cNvPr id="2" name="Title 1">
             <a:extLst>
               <a:ext uri="{FF2B5EF4-FFF2-40B4-BE49-F238E27FC236}">
-                <a16:creationId xmlns:a16="http://schemas.microsoft.com/office/drawing/2014/main" id="{28492750-E12D-4995-ABCB-5BB846060890}"/>
+                <a16:creationId xmlns:a16="http://schemas.microsoft.com/office/drawing/2014/main" xmlns="" id="{28492750-E12D-4995-ABCB-5BB846060890}"/>
               </a:ext>
             </a:extLst>
           </p:cNvPr>
@@ -4202,10 +4202,10 @@
           <p:cNvPr id="14" name="Rectangle 13">
             <a:extLst>
               <a:ext uri="{FF2B5EF4-FFF2-40B4-BE49-F238E27FC236}">
-                <a16:creationId xmlns:a16="http://schemas.microsoft.com/office/drawing/2014/main" id="{D87160F7-FCB2-48B7-8BB8-BEFF45F6BF18}"/>
+                <a16:creationId xmlns:a16="http://schemas.microsoft.com/office/drawing/2014/main" xmlns="" id="{D87160F7-FCB2-48B7-8BB8-BEFF45F6BF18}"/>
               </a:ext>
               <a:ext uri="{C183D7F6-B498-43B3-948B-1728B52AA6E4}">
-                <adec:decorative xmlns:adec="http://schemas.microsoft.com/office/drawing/2017/decorative" val="1"/>
+                <adec:decorative xmlns:adec="http://schemas.microsoft.com/office/drawing/2017/decorative" xmlns="" val="1"/>
               </a:ext>
             </a:extLst>
           </p:cNvPr>
@@ -4215,7 +4215,7 @@
           <p:nvPr>
             <p:extLst>
               <p:ext uri="{386F3935-93C4-4BCD-93E2-E3B085C9AB24}">
-                <p16:designElem xmlns:p16="http://schemas.microsoft.com/office/powerpoint/2015/main" val="1"/>
+                <p16:designElem xmlns:p16="http://schemas.microsoft.com/office/powerpoint/2015/main" xmlns="" val="1"/>
               </p:ext>
             </p:extLst>
           </p:nvPr>
@@ -4259,10 +4259,10 @@
           <p:cNvPr id="16" name="Rectangle 15">
             <a:extLst>
               <a:ext uri="{FF2B5EF4-FFF2-40B4-BE49-F238E27FC236}">
-                <a16:creationId xmlns:a16="http://schemas.microsoft.com/office/drawing/2014/main" id="{E9282B84-621E-4580-80B7-222118AE446D}"/>
+                <a16:creationId xmlns:a16="http://schemas.microsoft.com/office/drawing/2014/main" xmlns="" id="{E9282B84-621E-4580-80B7-222118AE446D}"/>
               </a:ext>
               <a:ext uri="{C183D7F6-B498-43B3-948B-1728B52AA6E4}">
-                <adec:decorative xmlns:adec="http://schemas.microsoft.com/office/drawing/2017/decorative" val="1"/>
+                <adec:decorative xmlns:adec="http://schemas.microsoft.com/office/drawing/2017/decorative" xmlns="" val="1"/>
               </a:ext>
             </a:extLst>
           </p:cNvPr>
@@ -4272,7 +4272,7 @@
           <p:nvPr>
             <p:extLst>
               <p:ext uri="{386F3935-93C4-4BCD-93E2-E3B085C9AB24}">
-                <p16:designElem xmlns:p16="http://schemas.microsoft.com/office/powerpoint/2015/main" val="1"/>
+                <p16:designElem xmlns:p16="http://schemas.microsoft.com/office/powerpoint/2015/main" xmlns="" val="1"/>
               </p:ext>
             </p:extLst>
           </p:nvPr>
@@ -4324,7 +4324,7 @@
         <p:spPr/>
         <p:txBody>
           <a:bodyPr>
-            <a:normAutofit fontScale="92500" lnSpcReduction="20000"/>
+            <a:normAutofit fontScale="92500" lnSpcReduction="10000"/>
           </a:bodyPr>
           <a:lstStyle/>
           <a:p>
@@ -4336,8 +4336,19 @@
                 <a:latin typeface="Times New Roman" panose="02020603050405020304" pitchFamily="18" charset="0"/>
                 <a:cs typeface="Times New Roman" panose="02020603050405020304" pitchFamily="18" charset="0"/>
               </a:rPr>
-              <a:t>Are customers willing to travel long distances to purchase products in spite of the high average product price in a shop?</a:t>
-            </a:r>
+              <a:t>Are customers willing to travel long distances to purchase </a:t>
+            </a:r>
+            <a:r>
+              <a:rPr lang="en-US" dirty="0" smtClean="0">
+                <a:latin typeface="Times New Roman" panose="02020603050405020304" pitchFamily="18" charset="0"/>
+                <a:cs typeface="Times New Roman" panose="02020603050405020304" pitchFamily="18" charset="0"/>
+              </a:rPr>
+              <a:t>products?</a:t>
+            </a:r>
+            <a:endParaRPr lang="en-US" dirty="0">
+              <a:latin typeface="Times New Roman" panose="02020603050405020304" pitchFamily="18" charset="0"/>
+              <a:cs typeface="Times New Roman" panose="02020603050405020304" pitchFamily="18" charset="0"/>
+            </a:endParaRPr>
           </a:p>
           <a:p>
             <a:endParaRPr lang="en-US" dirty="0">
@@ -5018,25 +5029,35 @@
           </a:p>
         </p:txBody>
       </p:sp>
-      <p:sp>
-        <p:nvSpPr>
-          <p:cNvPr id="3" name="Content Placeholder 2"/>
-          <p:cNvSpPr>
-            <a:spLocks noGrp="1"/>
-          </p:cNvSpPr>
+      <p:pic>
+        <p:nvPicPr>
+          <p:cNvPr id="6" name="Объект 5"/>
+          <p:cNvPicPr>
+            <a:picLocks noGrp="1" noChangeAspect="1"/>
+          </p:cNvPicPr>
           <p:nvPr>
             <p:ph idx="1"/>
           </p:nvPr>
-        </p:nvSpPr>
-        <p:spPr/>
-        <p:txBody>
-          <a:bodyPr/>
-          <a:lstStyle/>
-          <a:p>
-            <a:endParaRPr lang="en-US" dirty="0"/>
-          </a:p>
-        </p:txBody>
-      </p:sp>
+        </p:nvPicPr>
+        <p:blipFill>
+          <a:blip r:embed="rId2">
+            <a:extLst>
+              <a:ext uri="{28A0092B-C50C-407E-A947-70E740481C1C}">
+                <a14:useLocalDpi xmlns:a14="http://schemas.microsoft.com/office/drawing/2010/main" val="0"/>
+              </a:ext>
+            </a:extLst>
+          </a:blip>
+          <a:stretch>
+            <a:fillRect/>
+          </a:stretch>
+        </p:blipFill>
+        <p:spPr>
+          <a:xfrm>
+            <a:off x="4135438" y="1457325"/>
+            <a:ext cx="6781800" cy="3933825"/>
+          </a:xfrm>
+        </p:spPr>
+      </p:pic>
     </p:spTree>
     <p:extLst>
       <p:ext uri="{BB962C8B-B14F-4D97-AF65-F5344CB8AC3E}">
@@ -5170,7 +5191,7 @@
           <p:cNvPr id="21" name="Content Placeholder 20">
             <a:extLst>
               <a:ext uri="{FF2B5EF4-FFF2-40B4-BE49-F238E27FC236}">
-                <a16:creationId xmlns:a16="http://schemas.microsoft.com/office/drawing/2014/main" id="{331E4DC8-86C2-4525-8396-472B086B96A4}"/>
+                <a16:creationId xmlns:a16="http://schemas.microsoft.com/office/drawing/2014/main" xmlns="" id="{331E4DC8-86C2-4525-8396-472B086B96A4}"/>
               </a:ext>
             </a:extLst>
           </p:cNvPr>
@@ -5247,7 +5268,7 @@
           <p:cNvPr id="14" name="Content Placeholder 13" descr="A screenshot of text&#10;&#10;Description automatically generated">
             <a:extLst>
               <a:ext uri="{FF2B5EF4-FFF2-40B4-BE49-F238E27FC236}">
-                <a16:creationId xmlns:a16="http://schemas.microsoft.com/office/drawing/2014/main" id="{054B6262-BEBE-47E2-89B2-BEA264C1EDD3}"/>
+                <a16:creationId xmlns:a16="http://schemas.microsoft.com/office/drawing/2014/main" xmlns="" id="{054B6262-BEBE-47E2-89B2-BEA264C1EDD3}"/>
               </a:ext>
             </a:extLst>
           </p:cNvPr>
@@ -5506,10 +5527,10 @@
           <p:cNvPr id="10" name="Rectangle 9">
             <a:extLst>
               <a:ext uri="{FF2B5EF4-FFF2-40B4-BE49-F238E27FC236}">
-                <a16:creationId xmlns:a16="http://schemas.microsoft.com/office/drawing/2014/main" id="{474A7FC5-56F0-4FE3-8383-04EE92963F2A}"/>
+                <a16:creationId xmlns:a16="http://schemas.microsoft.com/office/drawing/2014/main" xmlns="" id="{474A7FC5-56F0-4FE3-8383-04EE92963F2A}"/>
               </a:ext>
               <a:ext uri="{C183D7F6-B498-43B3-948B-1728B52AA6E4}">
-                <adec:decorative xmlns:adec="http://schemas.microsoft.com/office/drawing/2017/decorative" val="1"/>
+                <adec:decorative xmlns:adec="http://schemas.microsoft.com/office/drawing/2017/decorative" xmlns="" val="1"/>
               </a:ext>
             </a:extLst>
           </p:cNvPr>
@@ -5519,7 +5540,7 @@
           <p:nvPr>
             <p:extLst>
               <p:ext uri="{386F3935-93C4-4BCD-93E2-E3B085C9AB24}">
-                <p16:designElem xmlns:p16="http://schemas.microsoft.com/office/powerpoint/2015/main" val="1"/>
+                <p16:designElem xmlns:p16="http://schemas.microsoft.com/office/powerpoint/2015/main" xmlns="" val="1"/>
               </p:ext>
             </p:extLst>
           </p:nvPr>
@@ -5566,7 +5587,7 @@
           <p:cNvPr id="5" name="Picture 4" descr="Working">
             <a:extLst>
               <a:ext uri="{FF2B5EF4-FFF2-40B4-BE49-F238E27FC236}">
-                <a16:creationId xmlns:a16="http://schemas.microsoft.com/office/drawing/2014/main" id="{BC829010-59E7-4B6E-AE76-EEE7D0ED0D81}"/>
+                <a16:creationId xmlns:a16="http://schemas.microsoft.com/office/drawing/2014/main" xmlns="" id="{BC829010-59E7-4B6E-AE76-EEE7D0ED0D81}"/>
               </a:ext>
             </a:extLst>
           </p:cNvPr>
@@ -5601,10 +5622,10 @@
           <p:cNvPr id="12" name="Rectangle 11">
             <a:extLst>
               <a:ext uri="{FF2B5EF4-FFF2-40B4-BE49-F238E27FC236}">
-                <a16:creationId xmlns:a16="http://schemas.microsoft.com/office/drawing/2014/main" id="{DE6BEBC3-6A99-4A53-9835-9875E08415A6}"/>
+                <a16:creationId xmlns:a16="http://schemas.microsoft.com/office/drawing/2014/main" xmlns="" id="{DE6BEBC3-6A99-4A53-9835-9875E08415A6}"/>
               </a:ext>
               <a:ext uri="{C183D7F6-B498-43B3-948B-1728B52AA6E4}">
-                <adec:decorative xmlns:adec="http://schemas.microsoft.com/office/drawing/2017/decorative" val="1"/>
+                <adec:decorative xmlns:adec="http://schemas.microsoft.com/office/drawing/2017/decorative" xmlns="" val="1"/>
               </a:ext>
             </a:extLst>
           </p:cNvPr>
@@ -5614,7 +5635,7 @@
           <p:nvPr>
             <p:extLst>
               <p:ext uri="{386F3935-93C4-4BCD-93E2-E3B085C9AB24}">
-                <p16:designElem xmlns:p16="http://schemas.microsoft.com/office/powerpoint/2015/main" val="1"/>
+                <p16:designElem xmlns:p16="http://schemas.microsoft.com/office/powerpoint/2015/main" xmlns="" val="1"/>
               </p:ext>
             </p:extLst>
           </p:nvPr>
@@ -5658,7 +5679,7 @@
           <p:cNvPr id="2" name="Title 1">
             <a:extLst>
               <a:ext uri="{FF2B5EF4-FFF2-40B4-BE49-F238E27FC236}">
-                <a16:creationId xmlns:a16="http://schemas.microsoft.com/office/drawing/2014/main" id="{F993299F-3E8A-4BF7-9C3D-B9F22CF94C4E}"/>
+                <a16:creationId xmlns:a16="http://schemas.microsoft.com/office/drawing/2014/main" xmlns="" id="{F993299F-3E8A-4BF7-9C3D-B9F22CF94C4E}"/>
               </a:ext>
             </a:extLst>
           </p:cNvPr>
@@ -5693,10 +5714,10 @@
           <p:cNvPr id="14" name="Rectangle 13">
             <a:extLst>
               <a:ext uri="{FF2B5EF4-FFF2-40B4-BE49-F238E27FC236}">
-                <a16:creationId xmlns:a16="http://schemas.microsoft.com/office/drawing/2014/main" id="{D1006911-EDB8-4CDF-AEAA-A3FA060851F3}"/>
+                <a16:creationId xmlns:a16="http://schemas.microsoft.com/office/drawing/2014/main" xmlns="" id="{D1006911-EDB8-4CDF-AEAA-A3FA060851F3}"/>
               </a:ext>
               <a:ext uri="{C183D7F6-B498-43B3-948B-1728B52AA6E4}">
-                <adec:decorative xmlns:adec="http://schemas.microsoft.com/office/drawing/2017/decorative" val="1"/>
+                <adec:decorative xmlns:adec="http://schemas.microsoft.com/office/drawing/2017/decorative" xmlns="" val="1"/>
               </a:ext>
             </a:extLst>
           </p:cNvPr>
@@ -5706,7 +5727,7 @@
           <p:nvPr>
             <p:extLst>
               <p:ext uri="{386F3935-93C4-4BCD-93E2-E3B085C9AB24}">
-                <p16:designElem xmlns:p16="http://schemas.microsoft.com/office/powerpoint/2015/main" val="1"/>
+                <p16:designElem xmlns:p16="http://schemas.microsoft.com/office/powerpoint/2015/main" xmlns="" val="1"/>
               </p:ext>
             </p:extLst>
           </p:nvPr>
@@ -5990,23 +6011,6 @@
 </file>
 
 <file path=customXml/item1.xml><?xml version="1.0" encoding="utf-8"?>
-<p:properties xmlns:p="http://schemas.microsoft.com/office/2006/metadata/properties" xmlns:xsi="http://www.w3.org/2001/XMLSchema-instance" xmlns:pc="http://schemas.microsoft.com/office/infopath/2007/PartnerControls">
-  <documentManagement>
-    <MediaServiceKeyPoints xmlns="71af3243-3dd4-4a8d-8c0d-dd76da1f02a5" xsi:nil="true"/>
-  </documentManagement>
-</p:properties>
-</file>
-
-<file path=customXml/item2.xml><?xml version="1.0" encoding="utf-8"?>
-<?mso-contentType ?>
-<FormTemplates xmlns="http://schemas.microsoft.com/sharepoint/v3/contenttype/forms">
-  <Display>DocumentLibraryForm</Display>
-  <Edit>DocumentLibraryForm</Edit>
-  <New>DocumentLibraryForm</New>
-</FormTemplates>
-</file>
-
-<file path=customXml/item3.xml><?xml version="1.0" encoding="utf-8"?>
 <ct:contentTypeSchema xmlns:ct="http://schemas.microsoft.com/office/2006/metadata/contentType" xmlns:ma="http://schemas.microsoft.com/office/2006/metadata/properties/metaAttributes" ct:_="" ma:_="" ma:contentTypeName="Document" ma:contentTypeID="0x01010079F111ED35F8CC479449609E8A0923A6" ma:contentTypeVersion="11" ma:contentTypeDescription="Create a new document." ma:contentTypeScope="" ma:versionID="1c2eb7a32e66fb6e4260f3771546a5e2">
   <xsd:schema xmlns:xsd="http://www.w3.org/2001/XMLSchema" xmlns:xs="http://www.w3.org/2001/XMLSchema" xmlns:p="http://schemas.microsoft.com/office/2006/metadata/properties" xmlns:ns2="71af3243-3dd4-4a8d-8c0d-dd76da1f02a5" xmlns:ns3="16c05727-aa75-4e4a-9b5f-8a80a1165891" targetNamespace="http://schemas.microsoft.com/office/2006/metadata/properties" ma:root="true" ma:fieldsID="04e1f6479c48b08974ba73b5ca973489" ns2:_="" ns3:_="">
     <xsd:import namespace="71af3243-3dd4-4a8d-8c0d-dd76da1f02a5"/>
@@ -6217,32 +6221,24 @@
 </ct:contentTypeSchema>
 </file>
 
-<file path=customXml/itemProps1.xml><?xml version="1.0" encoding="utf-8"?>
-<ds:datastoreItem xmlns:ds="http://schemas.openxmlformats.org/officeDocument/2006/customXml" ds:itemID="{30541854-87B3-4953-A183-EF3BD285377B}">
-  <ds:schemaRefs>
-    <ds:schemaRef ds:uri="http://schemas.openxmlformats.org/package/2006/metadata/core-properties"/>
-    <ds:schemaRef ds:uri="16c05727-aa75-4e4a-9b5f-8a80a1165891"/>
-    <ds:schemaRef ds:uri="http://purl.org/dc/dcmitype/"/>
-    <ds:schemaRef ds:uri="http://schemas.microsoft.com/office/infopath/2007/PartnerControls"/>
-    <ds:schemaRef ds:uri="http://schemas.microsoft.com/office/2006/documentManagement/types"/>
-    <ds:schemaRef ds:uri="http://purl.org/dc/elements/1.1/"/>
-    <ds:schemaRef ds:uri="http://schemas.microsoft.com/office/2006/metadata/properties"/>
-    <ds:schemaRef ds:uri="http://purl.org/dc/terms/"/>
-    <ds:schemaRef ds:uri="71af3243-3dd4-4a8d-8c0d-dd76da1f02a5"/>
-    <ds:schemaRef ds:uri="http://www.w3.org/XML/1998/namespace"/>
-  </ds:schemaRefs>
-</ds:datastoreItem>
+<file path=customXml/item2.xml><?xml version="1.0" encoding="utf-8"?>
+<?mso-contentType ?>
+<FormTemplates xmlns="http://schemas.microsoft.com/sharepoint/v3/contenttype/forms">
+  <Display>DocumentLibraryForm</Display>
+  <Edit>DocumentLibraryForm</Edit>
+  <New>DocumentLibraryForm</New>
+</FormTemplates>
 </file>
 
-<file path=customXml/itemProps2.xml><?xml version="1.0" encoding="utf-8"?>
-<ds:datastoreItem xmlns:ds="http://schemas.openxmlformats.org/officeDocument/2006/customXml" ds:itemID="{DFB9BFA2-1FA5-44A1-B975-10D6BF58ECD0}">
-  <ds:schemaRefs>
-    <ds:schemaRef ds:uri="http://schemas.microsoft.com/sharepoint/v3/contenttype/forms"/>
-  </ds:schemaRefs>
-</ds:datastoreItem>
+<file path=customXml/item3.xml><?xml version="1.0" encoding="utf-8"?>
+<p:properties xmlns:p="http://schemas.microsoft.com/office/2006/metadata/properties" xmlns:xsi="http://www.w3.org/2001/XMLSchema-instance" xmlns:pc="http://schemas.microsoft.com/office/infopath/2007/PartnerControls">
+  <documentManagement>
+    <MediaServiceKeyPoints xmlns="71af3243-3dd4-4a8d-8c0d-dd76da1f02a5" xsi:nil="true"/>
+  </documentManagement>
+</p:properties>
 </file>
 
-<file path=customXml/itemProps3.xml><?xml version="1.0" encoding="utf-8"?>
+<file path=customXml/itemProps1.xml><?xml version="1.0" encoding="utf-8"?>
 <ds:datastoreItem xmlns:ds="http://schemas.openxmlformats.org/officeDocument/2006/customXml" ds:itemID="{E577E783-5AB8-45E6-9E56-AE40075231B2}">
   <ds:schemaRefs>
     <ds:schemaRef ds:uri="http://schemas.microsoft.com/office/2006/metadata/contentType"/>
@@ -6259,4 +6255,29 @@
     <ds:schemaRef ds:uri="http://schemas.microsoft.com/internal/obd"/>
   </ds:schemaRefs>
 </ds:datastoreItem>
+</file>
+
+<file path=customXml/itemProps2.xml><?xml version="1.0" encoding="utf-8"?>
+<ds:datastoreItem xmlns:ds="http://schemas.openxmlformats.org/officeDocument/2006/customXml" ds:itemID="{DFB9BFA2-1FA5-44A1-B975-10D6BF58ECD0}">
+  <ds:schemaRefs>
+    <ds:schemaRef ds:uri="http://schemas.microsoft.com/sharepoint/v3/contenttype/forms"/>
+  </ds:schemaRefs>
+</ds:datastoreItem>
+</file>
+
+<file path=customXml/itemProps3.xml><?xml version="1.0" encoding="utf-8"?>
+<ds:datastoreItem xmlns:ds="http://schemas.openxmlformats.org/officeDocument/2006/customXml" ds:itemID="{30541854-87B3-4953-A183-EF3BD285377B}">
+  <ds:schemaRefs>
+    <ds:schemaRef ds:uri="http://schemas.openxmlformats.org/package/2006/metadata/core-properties"/>
+    <ds:schemaRef ds:uri="16c05727-aa75-4e4a-9b5f-8a80a1165891"/>
+    <ds:schemaRef ds:uri="http://purl.org/dc/dcmitype/"/>
+    <ds:schemaRef ds:uri="http://schemas.microsoft.com/office/infopath/2007/PartnerControls"/>
+    <ds:schemaRef ds:uri="http://schemas.microsoft.com/office/2006/documentManagement/types"/>
+    <ds:schemaRef ds:uri="http://purl.org/dc/elements/1.1/"/>
+    <ds:schemaRef ds:uri="http://schemas.microsoft.com/office/2006/metadata/properties"/>
+    <ds:schemaRef ds:uri="http://purl.org/dc/terms/"/>
+    <ds:schemaRef ds:uri="71af3243-3dd4-4a8d-8c0d-dd76da1f02a5"/>
+    <ds:schemaRef ds:uri="http://www.w3.org/XML/1998/namespace"/>
+  </ds:schemaRefs>
+</ds:datastoreItem>
 </file>
</xml_diff>

<commit_message>
fixed plot in pptx
</commit_message>
<xml_diff>
--- a/Screencast_Presentation.pptx
+++ b/Screencast_Presentation.pptx
@@ -2421,7 +2421,7 @@
           <p:cNvPr id="11" name="Content Placeholder 2">
             <a:extLst>
               <a:ext uri="{FF2B5EF4-FFF2-40B4-BE49-F238E27FC236}">
-                <a16:creationId xmlns:a16="http://schemas.microsoft.com/office/drawing/2014/main" xmlns="" id="{87B0DF2F-DAFD-4616-9E25-0C28D75BF306}"/>
+                <a16:creationId xmlns="" xmlns:a16="http://schemas.microsoft.com/office/drawing/2014/main" id="{87B0DF2F-DAFD-4616-9E25-0C28D75BF306}"/>
               </a:ext>
             </a:extLst>
           </p:cNvPr>
@@ -2512,7 +2512,7 @@
           <p:cNvPr id="12" name="Content Placeholder 2">
             <a:extLst>
               <a:ext uri="{FF2B5EF4-FFF2-40B4-BE49-F238E27FC236}">
-                <a16:creationId xmlns:a16="http://schemas.microsoft.com/office/drawing/2014/main" xmlns="" id="{336DA0F9-D851-437C-A45B-EC125A3D3DB3}"/>
+                <a16:creationId xmlns="" xmlns:a16="http://schemas.microsoft.com/office/drawing/2014/main" id="{336DA0F9-D851-437C-A45B-EC125A3D3DB3}"/>
               </a:ext>
             </a:extLst>
           </p:cNvPr>
@@ -2603,7 +2603,7 @@
           <p:cNvPr id="6" name="Text Placeholder 5">
             <a:extLst>
               <a:ext uri="{FF2B5EF4-FFF2-40B4-BE49-F238E27FC236}">
-                <a16:creationId xmlns:a16="http://schemas.microsoft.com/office/drawing/2014/main" xmlns="" id="{0FF0BA98-3AB4-4D88-B1C2-6279BCACFAD9}"/>
+                <a16:creationId xmlns="" xmlns:a16="http://schemas.microsoft.com/office/drawing/2014/main" id="{0FF0BA98-3AB4-4D88-B1C2-6279BCACFAD9}"/>
               </a:ext>
             </a:extLst>
           </p:cNvPr>
@@ -2665,7 +2665,7 @@
           <p:cNvPr id="13" name="Text Placeholder 5">
             <a:extLst>
               <a:ext uri="{FF2B5EF4-FFF2-40B4-BE49-F238E27FC236}">
-                <a16:creationId xmlns:a16="http://schemas.microsoft.com/office/drawing/2014/main" xmlns="" id="{D9DEF72B-B924-4A0D-8C83-3B370632C0D3}"/>
+                <a16:creationId xmlns="" xmlns:a16="http://schemas.microsoft.com/office/drawing/2014/main" id="{D9DEF72B-B924-4A0D-8C83-3B370632C0D3}"/>
               </a:ext>
             </a:extLst>
           </p:cNvPr>
@@ -2728,7 +2728,7 @@
           <p:cNvPr id="14" name="Text Placeholder 5">
             <a:extLst>
               <a:ext uri="{FF2B5EF4-FFF2-40B4-BE49-F238E27FC236}">
-                <a16:creationId xmlns:a16="http://schemas.microsoft.com/office/drawing/2014/main" xmlns="" id="{E9D30C54-E9E8-4300-8DA4-352DB3A71A4F}"/>
+                <a16:creationId xmlns="" xmlns:a16="http://schemas.microsoft.com/office/drawing/2014/main" id="{E9D30C54-E9E8-4300-8DA4-352DB3A71A4F}"/>
               </a:ext>
             </a:extLst>
           </p:cNvPr>
@@ -3799,10 +3799,10 @@
           <p:cNvPr id="10" name="Rectangle 9">
             <a:extLst>
               <a:ext uri="{FF2B5EF4-FFF2-40B4-BE49-F238E27FC236}">
-                <a16:creationId xmlns:a16="http://schemas.microsoft.com/office/drawing/2014/main" xmlns="" id="{8869841E-71E7-4F51-8E6F-5E8A5E375653}"/>
+                <a16:creationId xmlns="" xmlns:a16="http://schemas.microsoft.com/office/drawing/2014/main" id="{8869841E-71E7-4F51-8E6F-5E8A5E375653}"/>
               </a:ext>
               <a:ext uri="{C183D7F6-B498-43B3-948B-1728B52AA6E4}">
-                <adec:decorative xmlns:adec="http://schemas.microsoft.com/office/drawing/2017/decorative" xmlns="" val="1"/>
+                <adec:decorative xmlns="" xmlns:adec="http://schemas.microsoft.com/office/drawing/2017/decorative" val="1"/>
               </a:ext>
             </a:extLst>
           </p:cNvPr>
@@ -3812,7 +3812,7 @@
           <p:nvPr>
             <p:extLst>
               <p:ext uri="{386F3935-93C4-4BCD-93E2-E3B085C9AB24}">
-                <p16:designElem xmlns:p16="http://schemas.microsoft.com/office/powerpoint/2015/main" xmlns="" val="1"/>
+                <p16:designElem xmlns="" xmlns:p16="http://schemas.microsoft.com/office/powerpoint/2015/main" val="1"/>
               </p:ext>
             </p:extLst>
           </p:nvPr>
@@ -3859,7 +3859,7 @@
           <p:cNvPr id="5" name="Picture 4">
             <a:extLst>
               <a:ext uri="{FF2B5EF4-FFF2-40B4-BE49-F238E27FC236}">
-                <a16:creationId xmlns:a16="http://schemas.microsoft.com/office/drawing/2014/main" xmlns="" id="{A3A2E0DA-DA21-447D-AD1F-3DB915DD051B}"/>
+                <a16:creationId xmlns="" xmlns:a16="http://schemas.microsoft.com/office/drawing/2014/main" id="{A3A2E0DA-DA21-447D-AD1F-3DB915DD051B}"/>
               </a:ext>
             </a:extLst>
           </p:cNvPr>
@@ -3895,10 +3895,10 @@
           <p:cNvPr id="12" name="Rectangle 11">
             <a:extLst>
               <a:ext uri="{FF2B5EF4-FFF2-40B4-BE49-F238E27FC236}">
-                <a16:creationId xmlns:a16="http://schemas.microsoft.com/office/drawing/2014/main" xmlns="" id="{594B067E-A161-4B29-A8FA-FEEB1944952A}"/>
+                <a16:creationId xmlns="" xmlns:a16="http://schemas.microsoft.com/office/drawing/2014/main" id="{594B067E-A161-4B29-A8FA-FEEB1944952A}"/>
               </a:ext>
               <a:ext uri="{C183D7F6-B498-43B3-948B-1728B52AA6E4}">
-                <adec:decorative xmlns:adec="http://schemas.microsoft.com/office/drawing/2017/decorative" xmlns="" val="1"/>
+                <adec:decorative xmlns="" xmlns:adec="http://schemas.microsoft.com/office/drawing/2017/decorative" val="1"/>
               </a:ext>
             </a:extLst>
           </p:cNvPr>
@@ -3908,7 +3908,7 @@
           <p:nvPr>
             <p:extLst>
               <p:ext uri="{386F3935-93C4-4BCD-93E2-E3B085C9AB24}">
-                <p16:designElem xmlns:p16="http://schemas.microsoft.com/office/powerpoint/2015/main" xmlns="" val="1"/>
+                <p16:designElem xmlns="" xmlns:p16="http://schemas.microsoft.com/office/powerpoint/2015/main" val="1"/>
               </p:ext>
             </p:extLst>
           </p:nvPr>
@@ -3950,7 +3950,7 @@
           <p:cNvPr id="2" name="Title 1">
             <a:extLst>
               <a:ext uri="{FF2B5EF4-FFF2-40B4-BE49-F238E27FC236}">
-                <a16:creationId xmlns:a16="http://schemas.microsoft.com/office/drawing/2014/main" xmlns="" id="{7D6CA50C-1A88-4B3F-A34F-FE199F4205A2}"/>
+                <a16:creationId xmlns="" xmlns:a16="http://schemas.microsoft.com/office/drawing/2014/main" id="{7D6CA50C-1A88-4B3F-A34F-FE199F4205A2}"/>
               </a:ext>
             </a:extLst>
           </p:cNvPr>
@@ -4023,10 +4023,10 @@
           <p:cNvPr id="10" name="Rectangle 9">
             <a:extLst>
               <a:ext uri="{FF2B5EF4-FFF2-40B4-BE49-F238E27FC236}">
-                <a16:creationId xmlns:a16="http://schemas.microsoft.com/office/drawing/2014/main" xmlns="" id="{DA178560-78C9-4CB5-BE46-05302CDA8E98}"/>
+                <a16:creationId xmlns="" xmlns:a16="http://schemas.microsoft.com/office/drawing/2014/main" id="{DA178560-78C9-4CB5-BE46-05302CDA8E98}"/>
               </a:ext>
               <a:ext uri="{C183D7F6-B498-43B3-948B-1728B52AA6E4}">
-                <adec:decorative xmlns:adec="http://schemas.microsoft.com/office/drawing/2017/decorative" xmlns="" val="1"/>
+                <adec:decorative xmlns="" xmlns:adec="http://schemas.microsoft.com/office/drawing/2017/decorative" val="1"/>
               </a:ext>
             </a:extLst>
           </p:cNvPr>
@@ -4036,7 +4036,7 @@
           <p:nvPr>
             <p:extLst>
               <p:ext uri="{386F3935-93C4-4BCD-93E2-E3B085C9AB24}">
-                <p16:designElem xmlns:p16="http://schemas.microsoft.com/office/powerpoint/2015/main" xmlns="" val="1"/>
+                <p16:designElem xmlns="" xmlns:p16="http://schemas.microsoft.com/office/powerpoint/2015/main" val="1"/>
               </p:ext>
             </p:extLst>
           </p:nvPr>
@@ -4083,7 +4083,7 @@
           <p:cNvPr id="5" name="Picture 4" descr="multiple people looking at blueprints&#10;">
             <a:extLst>
               <a:ext uri="{FF2B5EF4-FFF2-40B4-BE49-F238E27FC236}">
-                <a16:creationId xmlns:a16="http://schemas.microsoft.com/office/drawing/2014/main" xmlns="" id="{DC582F7A-0108-4267-A3E3-CA43CDA209C6}"/>
+                <a16:creationId xmlns="" xmlns:a16="http://schemas.microsoft.com/office/drawing/2014/main" id="{DC582F7A-0108-4267-A3E3-CA43CDA209C6}"/>
               </a:ext>
             </a:extLst>
           </p:cNvPr>
@@ -4112,10 +4112,10 @@
           <p:cNvPr id="12" name="Rectangle 11">
             <a:extLst>
               <a:ext uri="{FF2B5EF4-FFF2-40B4-BE49-F238E27FC236}">
-                <a16:creationId xmlns:a16="http://schemas.microsoft.com/office/drawing/2014/main" xmlns="" id="{69461EC9-A94F-4225-B526-5C862F340FB6}"/>
+                <a16:creationId xmlns="" xmlns:a16="http://schemas.microsoft.com/office/drawing/2014/main" id="{69461EC9-A94F-4225-B526-5C862F340FB6}"/>
               </a:ext>
               <a:ext uri="{C183D7F6-B498-43B3-948B-1728B52AA6E4}">
-                <adec:decorative xmlns:adec="http://schemas.microsoft.com/office/drawing/2017/decorative" xmlns="" val="1"/>
+                <adec:decorative xmlns="" xmlns:adec="http://schemas.microsoft.com/office/drawing/2017/decorative" val="1"/>
               </a:ext>
             </a:extLst>
           </p:cNvPr>
@@ -4125,7 +4125,7 @@
           <p:nvPr>
             <p:extLst>
               <p:ext uri="{386F3935-93C4-4BCD-93E2-E3B085C9AB24}">
-                <p16:designElem xmlns:p16="http://schemas.microsoft.com/office/powerpoint/2015/main" xmlns="" val="1"/>
+                <p16:designElem xmlns="" xmlns:p16="http://schemas.microsoft.com/office/powerpoint/2015/main" val="1"/>
               </p:ext>
             </p:extLst>
           </p:nvPr>
@@ -4167,7 +4167,7 @@
           <p:cNvPr id="2" name="Title 1">
             <a:extLst>
               <a:ext uri="{FF2B5EF4-FFF2-40B4-BE49-F238E27FC236}">
-                <a16:creationId xmlns:a16="http://schemas.microsoft.com/office/drawing/2014/main" xmlns="" id="{28492750-E12D-4995-ABCB-5BB846060890}"/>
+                <a16:creationId xmlns="" xmlns:a16="http://schemas.microsoft.com/office/drawing/2014/main" id="{28492750-E12D-4995-ABCB-5BB846060890}"/>
               </a:ext>
             </a:extLst>
           </p:cNvPr>
@@ -4202,10 +4202,10 @@
           <p:cNvPr id="14" name="Rectangle 13">
             <a:extLst>
               <a:ext uri="{FF2B5EF4-FFF2-40B4-BE49-F238E27FC236}">
-                <a16:creationId xmlns:a16="http://schemas.microsoft.com/office/drawing/2014/main" xmlns="" id="{D87160F7-FCB2-48B7-8BB8-BEFF45F6BF18}"/>
+                <a16:creationId xmlns="" xmlns:a16="http://schemas.microsoft.com/office/drawing/2014/main" id="{D87160F7-FCB2-48B7-8BB8-BEFF45F6BF18}"/>
               </a:ext>
               <a:ext uri="{C183D7F6-B498-43B3-948B-1728B52AA6E4}">
-                <adec:decorative xmlns:adec="http://schemas.microsoft.com/office/drawing/2017/decorative" xmlns="" val="1"/>
+                <adec:decorative xmlns="" xmlns:adec="http://schemas.microsoft.com/office/drawing/2017/decorative" val="1"/>
               </a:ext>
             </a:extLst>
           </p:cNvPr>
@@ -4215,7 +4215,7 @@
           <p:nvPr>
             <p:extLst>
               <p:ext uri="{386F3935-93C4-4BCD-93E2-E3B085C9AB24}">
-                <p16:designElem xmlns:p16="http://schemas.microsoft.com/office/powerpoint/2015/main" xmlns="" val="1"/>
+                <p16:designElem xmlns="" xmlns:p16="http://schemas.microsoft.com/office/powerpoint/2015/main" val="1"/>
               </p:ext>
             </p:extLst>
           </p:nvPr>
@@ -4259,10 +4259,10 @@
           <p:cNvPr id="16" name="Rectangle 15">
             <a:extLst>
               <a:ext uri="{FF2B5EF4-FFF2-40B4-BE49-F238E27FC236}">
-                <a16:creationId xmlns:a16="http://schemas.microsoft.com/office/drawing/2014/main" xmlns="" id="{E9282B84-621E-4580-80B7-222118AE446D}"/>
+                <a16:creationId xmlns="" xmlns:a16="http://schemas.microsoft.com/office/drawing/2014/main" id="{E9282B84-621E-4580-80B7-222118AE446D}"/>
               </a:ext>
               <a:ext uri="{C183D7F6-B498-43B3-948B-1728B52AA6E4}">
-                <adec:decorative xmlns:adec="http://schemas.microsoft.com/office/drawing/2017/decorative" xmlns="" val="1"/>
+                <adec:decorative xmlns="" xmlns:adec="http://schemas.microsoft.com/office/drawing/2017/decorative" val="1"/>
               </a:ext>
             </a:extLst>
           </p:cNvPr>
@@ -4272,7 +4272,7 @@
           <p:nvPr>
             <p:extLst>
               <p:ext uri="{386F3935-93C4-4BCD-93E2-E3B085C9AB24}">
-                <p16:designElem xmlns:p16="http://schemas.microsoft.com/office/powerpoint/2015/main" xmlns="" val="1"/>
+                <p16:designElem xmlns="" xmlns:p16="http://schemas.microsoft.com/office/powerpoint/2015/main" val="1"/>
               </p:ext>
             </p:extLst>
           </p:nvPr>
@@ -5053,8 +5053,8 @@
         </p:blipFill>
         <p:spPr>
           <a:xfrm>
-            <a:off x="4135438" y="1457325"/>
-            <a:ext cx="6781800" cy="3933825"/>
+            <a:off x="4135438" y="1471464"/>
+            <a:ext cx="6781800" cy="3905547"/>
           </a:xfrm>
         </p:spPr>
       </p:pic>
@@ -5191,7 +5191,7 @@
           <p:cNvPr id="21" name="Content Placeholder 20">
             <a:extLst>
               <a:ext uri="{FF2B5EF4-FFF2-40B4-BE49-F238E27FC236}">
-                <a16:creationId xmlns:a16="http://schemas.microsoft.com/office/drawing/2014/main" xmlns="" id="{331E4DC8-86C2-4525-8396-472B086B96A4}"/>
+                <a16:creationId xmlns="" xmlns:a16="http://schemas.microsoft.com/office/drawing/2014/main" id="{331E4DC8-86C2-4525-8396-472B086B96A4}"/>
               </a:ext>
             </a:extLst>
           </p:cNvPr>
@@ -5268,7 +5268,7 @@
           <p:cNvPr id="14" name="Content Placeholder 13" descr="A screenshot of text&#10;&#10;Description automatically generated">
             <a:extLst>
               <a:ext uri="{FF2B5EF4-FFF2-40B4-BE49-F238E27FC236}">
-                <a16:creationId xmlns:a16="http://schemas.microsoft.com/office/drawing/2014/main" xmlns="" id="{054B6262-BEBE-47E2-89B2-BEA264C1EDD3}"/>
+                <a16:creationId xmlns="" xmlns:a16="http://schemas.microsoft.com/office/drawing/2014/main" id="{054B6262-BEBE-47E2-89B2-BEA264C1EDD3}"/>
               </a:ext>
             </a:extLst>
           </p:cNvPr>
@@ -5527,10 +5527,10 @@
           <p:cNvPr id="10" name="Rectangle 9">
             <a:extLst>
               <a:ext uri="{FF2B5EF4-FFF2-40B4-BE49-F238E27FC236}">
-                <a16:creationId xmlns:a16="http://schemas.microsoft.com/office/drawing/2014/main" xmlns="" id="{474A7FC5-56F0-4FE3-8383-04EE92963F2A}"/>
+                <a16:creationId xmlns="" xmlns:a16="http://schemas.microsoft.com/office/drawing/2014/main" id="{474A7FC5-56F0-4FE3-8383-04EE92963F2A}"/>
               </a:ext>
               <a:ext uri="{C183D7F6-B498-43B3-948B-1728B52AA6E4}">
-                <adec:decorative xmlns:adec="http://schemas.microsoft.com/office/drawing/2017/decorative" xmlns="" val="1"/>
+                <adec:decorative xmlns="" xmlns:adec="http://schemas.microsoft.com/office/drawing/2017/decorative" val="1"/>
               </a:ext>
             </a:extLst>
           </p:cNvPr>
@@ -5540,7 +5540,7 @@
           <p:nvPr>
             <p:extLst>
               <p:ext uri="{386F3935-93C4-4BCD-93E2-E3B085C9AB24}">
-                <p16:designElem xmlns:p16="http://schemas.microsoft.com/office/powerpoint/2015/main" xmlns="" val="1"/>
+                <p16:designElem xmlns="" xmlns:p16="http://schemas.microsoft.com/office/powerpoint/2015/main" val="1"/>
               </p:ext>
             </p:extLst>
           </p:nvPr>
@@ -5587,7 +5587,7 @@
           <p:cNvPr id="5" name="Picture 4" descr="Working">
             <a:extLst>
               <a:ext uri="{FF2B5EF4-FFF2-40B4-BE49-F238E27FC236}">
-                <a16:creationId xmlns:a16="http://schemas.microsoft.com/office/drawing/2014/main" xmlns="" id="{BC829010-59E7-4B6E-AE76-EEE7D0ED0D81}"/>
+                <a16:creationId xmlns="" xmlns:a16="http://schemas.microsoft.com/office/drawing/2014/main" id="{BC829010-59E7-4B6E-AE76-EEE7D0ED0D81}"/>
               </a:ext>
             </a:extLst>
           </p:cNvPr>
@@ -5622,10 +5622,10 @@
           <p:cNvPr id="12" name="Rectangle 11">
             <a:extLst>
               <a:ext uri="{FF2B5EF4-FFF2-40B4-BE49-F238E27FC236}">
-                <a16:creationId xmlns:a16="http://schemas.microsoft.com/office/drawing/2014/main" xmlns="" id="{DE6BEBC3-6A99-4A53-9835-9875E08415A6}"/>
+                <a16:creationId xmlns="" xmlns:a16="http://schemas.microsoft.com/office/drawing/2014/main" id="{DE6BEBC3-6A99-4A53-9835-9875E08415A6}"/>
               </a:ext>
               <a:ext uri="{C183D7F6-B498-43B3-948B-1728B52AA6E4}">
-                <adec:decorative xmlns:adec="http://schemas.microsoft.com/office/drawing/2017/decorative" xmlns="" val="1"/>
+                <adec:decorative xmlns="" xmlns:adec="http://schemas.microsoft.com/office/drawing/2017/decorative" val="1"/>
               </a:ext>
             </a:extLst>
           </p:cNvPr>
@@ -5635,7 +5635,7 @@
           <p:nvPr>
             <p:extLst>
               <p:ext uri="{386F3935-93C4-4BCD-93E2-E3B085C9AB24}">
-                <p16:designElem xmlns:p16="http://schemas.microsoft.com/office/powerpoint/2015/main" xmlns="" val="1"/>
+                <p16:designElem xmlns="" xmlns:p16="http://schemas.microsoft.com/office/powerpoint/2015/main" val="1"/>
               </p:ext>
             </p:extLst>
           </p:nvPr>
@@ -5679,7 +5679,7 @@
           <p:cNvPr id="2" name="Title 1">
             <a:extLst>
               <a:ext uri="{FF2B5EF4-FFF2-40B4-BE49-F238E27FC236}">
-                <a16:creationId xmlns:a16="http://schemas.microsoft.com/office/drawing/2014/main" xmlns="" id="{F993299F-3E8A-4BF7-9C3D-B9F22CF94C4E}"/>
+                <a16:creationId xmlns="" xmlns:a16="http://schemas.microsoft.com/office/drawing/2014/main" id="{F993299F-3E8A-4BF7-9C3D-B9F22CF94C4E}"/>
               </a:ext>
             </a:extLst>
           </p:cNvPr>
@@ -5714,10 +5714,10 @@
           <p:cNvPr id="14" name="Rectangle 13">
             <a:extLst>
               <a:ext uri="{FF2B5EF4-FFF2-40B4-BE49-F238E27FC236}">
-                <a16:creationId xmlns:a16="http://schemas.microsoft.com/office/drawing/2014/main" xmlns="" id="{D1006911-EDB8-4CDF-AEAA-A3FA060851F3}"/>
+                <a16:creationId xmlns="" xmlns:a16="http://schemas.microsoft.com/office/drawing/2014/main" id="{D1006911-EDB8-4CDF-AEAA-A3FA060851F3}"/>
               </a:ext>
               <a:ext uri="{C183D7F6-B498-43B3-948B-1728B52AA6E4}">
-                <adec:decorative xmlns:adec="http://schemas.microsoft.com/office/drawing/2017/decorative" xmlns="" val="1"/>
+                <adec:decorative xmlns="" xmlns:adec="http://schemas.microsoft.com/office/drawing/2017/decorative" val="1"/>
               </a:ext>
             </a:extLst>
           </p:cNvPr>
@@ -5727,7 +5727,7 @@
           <p:nvPr>
             <p:extLst>
               <p:ext uri="{386F3935-93C4-4BCD-93E2-E3B085C9AB24}">
-                <p16:designElem xmlns:p16="http://schemas.microsoft.com/office/powerpoint/2015/main" xmlns="" val="1"/>
+                <p16:designElem xmlns="" xmlns:p16="http://schemas.microsoft.com/office/powerpoint/2015/main" val="1"/>
               </p:ext>
             </p:extLst>
           </p:nvPr>
@@ -6011,6 +6011,23 @@
 </file>
 
 <file path=customXml/item1.xml><?xml version="1.0" encoding="utf-8"?>
+<p:properties xmlns:p="http://schemas.microsoft.com/office/2006/metadata/properties" xmlns:xsi="http://www.w3.org/2001/XMLSchema-instance" xmlns:pc="http://schemas.microsoft.com/office/infopath/2007/PartnerControls">
+  <documentManagement>
+    <MediaServiceKeyPoints xmlns="71af3243-3dd4-4a8d-8c0d-dd76da1f02a5" xsi:nil="true"/>
+  </documentManagement>
+</p:properties>
+</file>
+
+<file path=customXml/item2.xml><?xml version="1.0" encoding="utf-8"?>
+<?mso-contentType ?>
+<FormTemplates xmlns="http://schemas.microsoft.com/sharepoint/v3/contenttype/forms">
+  <Display>DocumentLibraryForm</Display>
+  <Edit>DocumentLibraryForm</Edit>
+  <New>DocumentLibraryForm</New>
+</FormTemplates>
+</file>
+
+<file path=customXml/item3.xml><?xml version="1.0" encoding="utf-8"?>
 <ct:contentTypeSchema xmlns:ct="http://schemas.microsoft.com/office/2006/metadata/contentType" xmlns:ma="http://schemas.microsoft.com/office/2006/metadata/properties/metaAttributes" ct:_="" ma:_="" ma:contentTypeName="Document" ma:contentTypeID="0x01010079F111ED35F8CC479449609E8A0923A6" ma:contentTypeVersion="11" ma:contentTypeDescription="Create a new document." ma:contentTypeScope="" ma:versionID="1c2eb7a32e66fb6e4260f3771546a5e2">
   <xsd:schema xmlns:xsd="http://www.w3.org/2001/XMLSchema" xmlns:xs="http://www.w3.org/2001/XMLSchema" xmlns:p="http://schemas.microsoft.com/office/2006/metadata/properties" xmlns:ns2="71af3243-3dd4-4a8d-8c0d-dd76da1f02a5" xmlns:ns3="16c05727-aa75-4e4a-9b5f-8a80a1165891" targetNamespace="http://schemas.microsoft.com/office/2006/metadata/properties" ma:root="true" ma:fieldsID="04e1f6479c48b08974ba73b5ca973489" ns2:_="" ns3:_="">
     <xsd:import namespace="71af3243-3dd4-4a8d-8c0d-dd76da1f02a5"/>
@@ -6221,24 +6238,32 @@
 </ct:contentTypeSchema>
 </file>
 
-<file path=customXml/item2.xml><?xml version="1.0" encoding="utf-8"?>
-<?mso-contentType ?>
-<FormTemplates xmlns="http://schemas.microsoft.com/sharepoint/v3/contenttype/forms">
-  <Display>DocumentLibraryForm</Display>
-  <Edit>DocumentLibraryForm</Edit>
-  <New>DocumentLibraryForm</New>
-</FormTemplates>
+<file path=customXml/itemProps1.xml><?xml version="1.0" encoding="utf-8"?>
+<ds:datastoreItem xmlns:ds="http://schemas.openxmlformats.org/officeDocument/2006/customXml" ds:itemID="{30541854-87B3-4953-A183-EF3BD285377B}">
+  <ds:schemaRefs>
+    <ds:schemaRef ds:uri="http://schemas.openxmlformats.org/package/2006/metadata/core-properties"/>
+    <ds:schemaRef ds:uri="16c05727-aa75-4e4a-9b5f-8a80a1165891"/>
+    <ds:schemaRef ds:uri="http://purl.org/dc/dcmitype/"/>
+    <ds:schemaRef ds:uri="http://schemas.microsoft.com/office/infopath/2007/PartnerControls"/>
+    <ds:schemaRef ds:uri="http://schemas.microsoft.com/office/2006/documentManagement/types"/>
+    <ds:schemaRef ds:uri="http://purl.org/dc/elements/1.1/"/>
+    <ds:schemaRef ds:uri="http://schemas.microsoft.com/office/2006/metadata/properties"/>
+    <ds:schemaRef ds:uri="http://purl.org/dc/terms/"/>
+    <ds:schemaRef ds:uri="71af3243-3dd4-4a8d-8c0d-dd76da1f02a5"/>
+    <ds:schemaRef ds:uri="http://www.w3.org/XML/1998/namespace"/>
+  </ds:schemaRefs>
+</ds:datastoreItem>
 </file>
 
-<file path=customXml/item3.xml><?xml version="1.0" encoding="utf-8"?>
-<p:properties xmlns:p="http://schemas.microsoft.com/office/2006/metadata/properties" xmlns:xsi="http://www.w3.org/2001/XMLSchema-instance" xmlns:pc="http://schemas.microsoft.com/office/infopath/2007/PartnerControls">
-  <documentManagement>
-    <MediaServiceKeyPoints xmlns="71af3243-3dd4-4a8d-8c0d-dd76da1f02a5" xsi:nil="true"/>
-  </documentManagement>
-</p:properties>
+<file path=customXml/itemProps2.xml><?xml version="1.0" encoding="utf-8"?>
+<ds:datastoreItem xmlns:ds="http://schemas.openxmlformats.org/officeDocument/2006/customXml" ds:itemID="{DFB9BFA2-1FA5-44A1-B975-10D6BF58ECD0}">
+  <ds:schemaRefs>
+    <ds:schemaRef ds:uri="http://schemas.microsoft.com/sharepoint/v3/contenttype/forms"/>
+  </ds:schemaRefs>
+</ds:datastoreItem>
 </file>
 
-<file path=customXml/itemProps1.xml><?xml version="1.0" encoding="utf-8"?>
+<file path=customXml/itemProps3.xml><?xml version="1.0" encoding="utf-8"?>
 <ds:datastoreItem xmlns:ds="http://schemas.openxmlformats.org/officeDocument/2006/customXml" ds:itemID="{E577E783-5AB8-45E6-9E56-AE40075231B2}">
   <ds:schemaRefs>
     <ds:schemaRef ds:uri="http://schemas.microsoft.com/office/2006/metadata/contentType"/>
@@ -6255,29 +6280,4 @@
     <ds:schemaRef ds:uri="http://schemas.microsoft.com/internal/obd"/>
   </ds:schemaRefs>
 </ds:datastoreItem>
-</file>
-
-<file path=customXml/itemProps2.xml><?xml version="1.0" encoding="utf-8"?>
-<ds:datastoreItem xmlns:ds="http://schemas.openxmlformats.org/officeDocument/2006/customXml" ds:itemID="{DFB9BFA2-1FA5-44A1-B975-10D6BF58ECD0}">
-  <ds:schemaRefs>
-    <ds:schemaRef ds:uri="http://schemas.microsoft.com/sharepoint/v3/contenttype/forms"/>
-  </ds:schemaRefs>
-</ds:datastoreItem>
-</file>
-
-<file path=customXml/itemProps3.xml><?xml version="1.0" encoding="utf-8"?>
-<ds:datastoreItem xmlns:ds="http://schemas.openxmlformats.org/officeDocument/2006/customXml" ds:itemID="{30541854-87B3-4953-A183-EF3BD285377B}">
-  <ds:schemaRefs>
-    <ds:schemaRef ds:uri="http://schemas.openxmlformats.org/package/2006/metadata/core-properties"/>
-    <ds:schemaRef ds:uri="16c05727-aa75-4e4a-9b5f-8a80a1165891"/>
-    <ds:schemaRef ds:uri="http://purl.org/dc/dcmitype/"/>
-    <ds:schemaRef ds:uri="http://schemas.microsoft.com/office/infopath/2007/PartnerControls"/>
-    <ds:schemaRef ds:uri="http://schemas.microsoft.com/office/2006/documentManagement/types"/>
-    <ds:schemaRef ds:uri="http://purl.org/dc/elements/1.1/"/>
-    <ds:schemaRef ds:uri="http://schemas.microsoft.com/office/2006/metadata/properties"/>
-    <ds:schemaRef ds:uri="http://purl.org/dc/terms/"/>
-    <ds:schemaRef ds:uri="71af3243-3dd4-4a8d-8c0d-dd76da1f02a5"/>
-    <ds:schemaRef ds:uri="http://www.w3.org/XML/1998/namespace"/>
-  </ds:schemaRefs>
-</ds:datastoreItem>
 </file>
</xml_diff>

<commit_message>
updated picture for rq1
</commit_message>
<xml_diff>
--- a/Screencast_Presentation.pptx
+++ b/Screencast_Presentation.pptx
@@ -344,7 +344,7 @@
             <a:fld id="{5586B75A-687E-405C-8A0B-8D00578BA2C3}" type="datetimeFigureOut">
               <a:rPr lang="en-US" smtClean="0"/>
               <a:pPr/>
-              <a:t>1/8/2019</a:t>
+              <a:t>1/10/2019</a:t>
             </a:fld>
             <a:endParaRPr lang="en-US" dirty="0"/>
           </a:p>
@@ -516,7 +516,7 @@
             <a:fld id="{5586B75A-687E-405C-8A0B-8D00578BA2C3}" type="datetimeFigureOut">
               <a:rPr lang="en-US" smtClean="0"/>
               <a:pPr/>
-              <a:t>1/8/2019</a:t>
+              <a:t>1/10/2019</a:t>
             </a:fld>
             <a:endParaRPr lang="en-US" dirty="0"/>
           </a:p>
@@ -698,7 +698,7 @@
             <a:fld id="{5586B75A-687E-405C-8A0B-8D00578BA2C3}" type="datetimeFigureOut">
               <a:rPr lang="en-US" smtClean="0"/>
               <a:pPr/>
-              <a:t>1/8/2019</a:t>
+              <a:t>1/10/2019</a:t>
             </a:fld>
             <a:endParaRPr lang="en-US" dirty="0"/>
           </a:p>
@@ -870,7 +870,7 @@
             <a:fld id="{5586B75A-687E-405C-8A0B-8D00578BA2C3}" type="datetimeFigureOut">
               <a:rPr lang="en-US" smtClean="0"/>
               <a:pPr/>
-              <a:t>1/8/2019</a:t>
+              <a:t>1/10/2019</a:t>
             </a:fld>
             <a:endParaRPr lang="en-US" dirty="0"/>
           </a:p>
@@ -1126,7 +1126,7 @@
             <a:fld id="{5586B75A-687E-405C-8A0B-8D00578BA2C3}" type="datetimeFigureOut">
               <a:rPr lang="en-US" smtClean="0"/>
               <a:pPr/>
-              <a:t>1/8/2019</a:t>
+              <a:t>1/10/2019</a:t>
             </a:fld>
             <a:endParaRPr lang="en-US" dirty="0"/>
           </a:p>
@@ -1416,7 +1416,7 @@
             <a:fld id="{5586B75A-687E-405C-8A0B-8D00578BA2C3}" type="datetimeFigureOut">
               <a:rPr lang="en-US" smtClean="0"/>
               <a:pPr/>
-              <a:t>1/8/2019</a:t>
+              <a:t>1/10/2019</a:t>
             </a:fld>
             <a:endParaRPr lang="en-US" dirty="0"/>
           </a:p>
@@ -1860,7 +1860,7 @@
             <a:fld id="{5586B75A-687E-405C-8A0B-8D00578BA2C3}" type="datetimeFigureOut">
               <a:rPr lang="en-US" smtClean="0"/>
               <a:pPr/>
-              <a:t>1/8/2019</a:t>
+              <a:t>1/10/2019</a:t>
             </a:fld>
             <a:endParaRPr lang="en-US" dirty="0"/>
           </a:p>
@@ -1980,7 +1980,7 @@
             <a:fld id="{5586B75A-687E-405C-8A0B-8D00578BA2C3}" type="datetimeFigureOut">
               <a:rPr lang="en-US" smtClean="0"/>
               <a:pPr/>
-              <a:t>1/8/2019</a:t>
+              <a:t>1/10/2019</a:t>
             </a:fld>
             <a:endParaRPr lang="en-US" dirty="0"/>
           </a:p>
@@ -2077,7 +2077,7 @@
             <a:fld id="{5586B75A-687E-405C-8A0B-8D00578BA2C3}" type="datetimeFigureOut">
               <a:rPr lang="en-US" smtClean="0"/>
               <a:pPr/>
-              <a:t>1/8/2019</a:t>
+              <a:t>1/10/2019</a:t>
             </a:fld>
             <a:endParaRPr lang="en-US" dirty="0"/>
           </a:p>
@@ -2367,7 +2367,7 @@
             <a:fld id="{5586B75A-687E-405C-8A0B-8D00578BA2C3}" type="datetimeFigureOut">
               <a:rPr lang="en-US" smtClean="0"/>
               <a:pPr/>
-              <a:t>1/8/2019</a:t>
+              <a:t>1/10/2019</a:t>
             </a:fld>
             <a:endParaRPr lang="en-US" dirty="0"/>
           </a:p>
@@ -2421,7 +2421,7 @@
           <p:cNvPr id="11" name="Content Placeholder 2">
             <a:extLst>
               <a:ext uri="{FF2B5EF4-FFF2-40B4-BE49-F238E27FC236}">
-                <a16:creationId xmlns:a16="http://schemas.microsoft.com/office/drawing/2014/main" id="{87B0DF2F-DAFD-4616-9E25-0C28D75BF306}"/>
+                <a16:creationId xmlns:a16="http://schemas.microsoft.com/office/drawing/2014/main" xmlns="" id="{87B0DF2F-DAFD-4616-9E25-0C28D75BF306}"/>
               </a:ext>
             </a:extLst>
           </p:cNvPr>
@@ -2512,7 +2512,7 @@
           <p:cNvPr id="12" name="Content Placeholder 2">
             <a:extLst>
               <a:ext uri="{FF2B5EF4-FFF2-40B4-BE49-F238E27FC236}">
-                <a16:creationId xmlns:a16="http://schemas.microsoft.com/office/drawing/2014/main" id="{336DA0F9-D851-437C-A45B-EC125A3D3DB3}"/>
+                <a16:creationId xmlns:a16="http://schemas.microsoft.com/office/drawing/2014/main" xmlns="" id="{336DA0F9-D851-437C-A45B-EC125A3D3DB3}"/>
               </a:ext>
             </a:extLst>
           </p:cNvPr>
@@ -2603,7 +2603,7 @@
           <p:cNvPr id="6" name="Text Placeholder 5">
             <a:extLst>
               <a:ext uri="{FF2B5EF4-FFF2-40B4-BE49-F238E27FC236}">
-                <a16:creationId xmlns:a16="http://schemas.microsoft.com/office/drawing/2014/main" id="{0FF0BA98-3AB4-4D88-B1C2-6279BCACFAD9}"/>
+                <a16:creationId xmlns:a16="http://schemas.microsoft.com/office/drawing/2014/main" xmlns="" id="{0FF0BA98-3AB4-4D88-B1C2-6279BCACFAD9}"/>
               </a:ext>
             </a:extLst>
           </p:cNvPr>
@@ -2665,7 +2665,7 @@
           <p:cNvPr id="13" name="Text Placeholder 5">
             <a:extLst>
               <a:ext uri="{FF2B5EF4-FFF2-40B4-BE49-F238E27FC236}">
-                <a16:creationId xmlns:a16="http://schemas.microsoft.com/office/drawing/2014/main" id="{D9DEF72B-B924-4A0D-8C83-3B370632C0D3}"/>
+                <a16:creationId xmlns:a16="http://schemas.microsoft.com/office/drawing/2014/main" xmlns="" id="{D9DEF72B-B924-4A0D-8C83-3B370632C0D3}"/>
               </a:ext>
             </a:extLst>
           </p:cNvPr>
@@ -2728,7 +2728,7 @@
           <p:cNvPr id="14" name="Text Placeholder 5">
             <a:extLst>
               <a:ext uri="{FF2B5EF4-FFF2-40B4-BE49-F238E27FC236}">
-                <a16:creationId xmlns:a16="http://schemas.microsoft.com/office/drawing/2014/main" id="{E9D30C54-E9E8-4300-8DA4-352DB3A71A4F}"/>
+                <a16:creationId xmlns:a16="http://schemas.microsoft.com/office/drawing/2014/main" xmlns="" id="{E9D30C54-E9E8-4300-8DA4-352DB3A71A4F}"/>
               </a:ext>
             </a:extLst>
           </p:cNvPr>
@@ -3011,7 +3011,7 @@
             <a:fld id="{5586B75A-687E-405C-8A0B-8D00578BA2C3}" type="datetimeFigureOut">
               <a:rPr lang="en-US" smtClean="0"/>
               <a:pPr/>
-              <a:t>1/8/2019</a:t>
+              <a:t>1/10/2019</a:t>
             </a:fld>
             <a:endParaRPr lang="en-US" dirty="0"/>
           </a:p>
@@ -3310,7 +3310,7 @@
             <a:fld id="{5586B75A-687E-405C-8A0B-8D00578BA2C3}" type="datetimeFigureOut">
               <a:rPr lang="en-US" smtClean="0"/>
               <a:pPr/>
-              <a:t>1/8/2019</a:t>
+              <a:t>1/10/2019</a:t>
             </a:fld>
             <a:endParaRPr lang="en-US" dirty="0"/>
           </a:p>
@@ -3799,10 +3799,10 @@
           <p:cNvPr id="10" name="Rectangle 9">
             <a:extLst>
               <a:ext uri="{FF2B5EF4-FFF2-40B4-BE49-F238E27FC236}">
-                <a16:creationId xmlns:a16="http://schemas.microsoft.com/office/drawing/2014/main" id="{8869841E-71E7-4F51-8E6F-5E8A5E375653}"/>
+                <a16:creationId xmlns:a16="http://schemas.microsoft.com/office/drawing/2014/main" xmlns="" id="{8869841E-71E7-4F51-8E6F-5E8A5E375653}"/>
               </a:ext>
               <a:ext uri="{C183D7F6-B498-43B3-948B-1728B52AA6E4}">
-                <adec:decorative xmlns:adec="http://schemas.microsoft.com/office/drawing/2017/decorative" val="1"/>
+                <adec:decorative xmlns:adec="http://schemas.microsoft.com/office/drawing/2017/decorative" xmlns="" val="1"/>
               </a:ext>
             </a:extLst>
           </p:cNvPr>
@@ -3812,7 +3812,7 @@
           <p:nvPr>
             <p:extLst>
               <p:ext uri="{386F3935-93C4-4BCD-93E2-E3B085C9AB24}">
-                <p16:designElem xmlns:p16="http://schemas.microsoft.com/office/powerpoint/2015/main" val="1"/>
+                <p16:designElem xmlns:p16="http://schemas.microsoft.com/office/powerpoint/2015/main" xmlns="" val="1"/>
               </p:ext>
             </p:extLst>
           </p:nvPr>
@@ -3859,7 +3859,7 @@
           <p:cNvPr id="5" name="Picture 4">
             <a:extLst>
               <a:ext uri="{FF2B5EF4-FFF2-40B4-BE49-F238E27FC236}">
-                <a16:creationId xmlns:a16="http://schemas.microsoft.com/office/drawing/2014/main" id="{A3A2E0DA-DA21-447D-AD1F-3DB915DD051B}"/>
+                <a16:creationId xmlns:a16="http://schemas.microsoft.com/office/drawing/2014/main" xmlns="" id="{A3A2E0DA-DA21-447D-AD1F-3DB915DD051B}"/>
               </a:ext>
             </a:extLst>
           </p:cNvPr>
@@ -3895,10 +3895,10 @@
           <p:cNvPr id="12" name="Rectangle 11">
             <a:extLst>
               <a:ext uri="{FF2B5EF4-FFF2-40B4-BE49-F238E27FC236}">
-                <a16:creationId xmlns:a16="http://schemas.microsoft.com/office/drawing/2014/main" id="{594B067E-A161-4B29-A8FA-FEEB1944952A}"/>
+                <a16:creationId xmlns:a16="http://schemas.microsoft.com/office/drawing/2014/main" xmlns="" id="{594B067E-A161-4B29-A8FA-FEEB1944952A}"/>
               </a:ext>
               <a:ext uri="{C183D7F6-B498-43B3-948B-1728B52AA6E4}">
-                <adec:decorative xmlns:adec="http://schemas.microsoft.com/office/drawing/2017/decorative" val="1"/>
+                <adec:decorative xmlns:adec="http://schemas.microsoft.com/office/drawing/2017/decorative" xmlns="" val="1"/>
               </a:ext>
             </a:extLst>
           </p:cNvPr>
@@ -3908,7 +3908,7 @@
           <p:nvPr>
             <p:extLst>
               <p:ext uri="{386F3935-93C4-4BCD-93E2-E3B085C9AB24}">
-                <p16:designElem xmlns:p16="http://schemas.microsoft.com/office/powerpoint/2015/main" val="1"/>
+                <p16:designElem xmlns:p16="http://schemas.microsoft.com/office/powerpoint/2015/main" xmlns="" val="1"/>
               </p:ext>
             </p:extLst>
           </p:nvPr>
@@ -3950,7 +3950,7 @@
           <p:cNvPr id="2" name="Title 1">
             <a:extLst>
               <a:ext uri="{FF2B5EF4-FFF2-40B4-BE49-F238E27FC236}">
-                <a16:creationId xmlns:a16="http://schemas.microsoft.com/office/drawing/2014/main" id="{7D6CA50C-1A88-4B3F-A34F-FE199F4205A2}"/>
+                <a16:creationId xmlns:a16="http://schemas.microsoft.com/office/drawing/2014/main" xmlns="" id="{7D6CA50C-1A88-4B3F-A34F-FE199F4205A2}"/>
               </a:ext>
             </a:extLst>
           </p:cNvPr>
@@ -4023,10 +4023,10 @@
           <p:cNvPr id="10" name="Rectangle 9">
             <a:extLst>
               <a:ext uri="{FF2B5EF4-FFF2-40B4-BE49-F238E27FC236}">
-                <a16:creationId xmlns:a16="http://schemas.microsoft.com/office/drawing/2014/main" id="{DA178560-78C9-4CB5-BE46-05302CDA8E98}"/>
+                <a16:creationId xmlns:a16="http://schemas.microsoft.com/office/drawing/2014/main" xmlns="" id="{DA178560-78C9-4CB5-BE46-05302CDA8E98}"/>
               </a:ext>
               <a:ext uri="{C183D7F6-B498-43B3-948B-1728B52AA6E4}">
-                <adec:decorative xmlns:adec="http://schemas.microsoft.com/office/drawing/2017/decorative" val="1"/>
+                <adec:decorative xmlns:adec="http://schemas.microsoft.com/office/drawing/2017/decorative" xmlns="" val="1"/>
               </a:ext>
             </a:extLst>
           </p:cNvPr>
@@ -4036,7 +4036,7 @@
           <p:nvPr>
             <p:extLst>
               <p:ext uri="{386F3935-93C4-4BCD-93E2-E3B085C9AB24}">
-                <p16:designElem xmlns:p16="http://schemas.microsoft.com/office/powerpoint/2015/main" val="1"/>
+                <p16:designElem xmlns:p16="http://schemas.microsoft.com/office/powerpoint/2015/main" xmlns="" val="1"/>
               </p:ext>
             </p:extLst>
           </p:nvPr>
@@ -4083,7 +4083,7 @@
           <p:cNvPr id="5" name="Picture 4" descr="multiple people looking at blueprints&#10;">
             <a:extLst>
               <a:ext uri="{FF2B5EF4-FFF2-40B4-BE49-F238E27FC236}">
-                <a16:creationId xmlns:a16="http://schemas.microsoft.com/office/drawing/2014/main" id="{DC582F7A-0108-4267-A3E3-CA43CDA209C6}"/>
+                <a16:creationId xmlns:a16="http://schemas.microsoft.com/office/drawing/2014/main" xmlns="" id="{DC582F7A-0108-4267-A3E3-CA43CDA209C6}"/>
               </a:ext>
             </a:extLst>
           </p:cNvPr>
@@ -4112,10 +4112,10 @@
           <p:cNvPr id="12" name="Rectangle 11">
             <a:extLst>
               <a:ext uri="{FF2B5EF4-FFF2-40B4-BE49-F238E27FC236}">
-                <a16:creationId xmlns:a16="http://schemas.microsoft.com/office/drawing/2014/main" id="{69461EC9-A94F-4225-B526-5C862F340FB6}"/>
+                <a16:creationId xmlns:a16="http://schemas.microsoft.com/office/drawing/2014/main" xmlns="" id="{69461EC9-A94F-4225-B526-5C862F340FB6}"/>
               </a:ext>
               <a:ext uri="{C183D7F6-B498-43B3-948B-1728B52AA6E4}">
-                <adec:decorative xmlns:adec="http://schemas.microsoft.com/office/drawing/2017/decorative" val="1"/>
+                <adec:decorative xmlns:adec="http://schemas.microsoft.com/office/drawing/2017/decorative" xmlns="" val="1"/>
               </a:ext>
             </a:extLst>
           </p:cNvPr>
@@ -4125,7 +4125,7 @@
           <p:nvPr>
             <p:extLst>
               <p:ext uri="{386F3935-93C4-4BCD-93E2-E3B085C9AB24}">
-                <p16:designElem xmlns:p16="http://schemas.microsoft.com/office/powerpoint/2015/main" val="1"/>
+                <p16:designElem xmlns:p16="http://schemas.microsoft.com/office/powerpoint/2015/main" xmlns="" val="1"/>
               </p:ext>
             </p:extLst>
           </p:nvPr>
@@ -4167,7 +4167,7 @@
           <p:cNvPr id="2" name="Title 1">
             <a:extLst>
               <a:ext uri="{FF2B5EF4-FFF2-40B4-BE49-F238E27FC236}">
-                <a16:creationId xmlns:a16="http://schemas.microsoft.com/office/drawing/2014/main" id="{28492750-E12D-4995-ABCB-5BB846060890}"/>
+                <a16:creationId xmlns:a16="http://schemas.microsoft.com/office/drawing/2014/main" xmlns="" id="{28492750-E12D-4995-ABCB-5BB846060890}"/>
               </a:ext>
             </a:extLst>
           </p:cNvPr>
@@ -4202,10 +4202,10 @@
           <p:cNvPr id="14" name="Rectangle 13">
             <a:extLst>
               <a:ext uri="{FF2B5EF4-FFF2-40B4-BE49-F238E27FC236}">
-                <a16:creationId xmlns:a16="http://schemas.microsoft.com/office/drawing/2014/main" id="{D87160F7-FCB2-48B7-8BB8-BEFF45F6BF18}"/>
+                <a16:creationId xmlns:a16="http://schemas.microsoft.com/office/drawing/2014/main" xmlns="" id="{D87160F7-FCB2-48B7-8BB8-BEFF45F6BF18}"/>
               </a:ext>
               <a:ext uri="{C183D7F6-B498-43B3-948B-1728B52AA6E4}">
-                <adec:decorative xmlns:adec="http://schemas.microsoft.com/office/drawing/2017/decorative" val="1"/>
+                <adec:decorative xmlns:adec="http://schemas.microsoft.com/office/drawing/2017/decorative" xmlns="" val="1"/>
               </a:ext>
             </a:extLst>
           </p:cNvPr>
@@ -4215,7 +4215,7 @@
           <p:nvPr>
             <p:extLst>
               <p:ext uri="{386F3935-93C4-4BCD-93E2-E3B085C9AB24}">
-                <p16:designElem xmlns:p16="http://schemas.microsoft.com/office/powerpoint/2015/main" val="1"/>
+                <p16:designElem xmlns:p16="http://schemas.microsoft.com/office/powerpoint/2015/main" xmlns="" val="1"/>
               </p:ext>
             </p:extLst>
           </p:nvPr>
@@ -4259,10 +4259,10 @@
           <p:cNvPr id="16" name="Rectangle 15">
             <a:extLst>
               <a:ext uri="{FF2B5EF4-FFF2-40B4-BE49-F238E27FC236}">
-                <a16:creationId xmlns:a16="http://schemas.microsoft.com/office/drawing/2014/main" id="{E9282B84-621E-4580-80B7-222118AE446D}"/>
+                <a16:creationId xmlns:a16="http://schemas.microsoft.com/office/drawing/2014/main" xmlns="" id="{E9282B84-621E-4580-80B7-222118AE446D}"/>
               </a:ext>
               <a:ext uri="{C183D7F6-B498-43B3-948B-1728B52AA6E4}">
-                <adec:decorative xmlns:adec="http://schemas.microsoft.com/office/drawing/2017/decorative" val="1"/>
+                <adec:decorative xmlns:adec="http://schemas.microsoft.com/office/drawing/2017/decorative" xmlns="" val="1"/>
               </a:ext>
             </a:extLst>
           </p:cNvPr>
@@ -4272,7 +4272,7 @@
           <p:nvPr>
             <p:extLst>
               <p:ext uri="{386F3935-93C4-4BCD-93E2-E3B085C9AB24}">
-                <p16:designElem xmlns:p16="http://schemas.microsoft.com/office/powerpoint/2015/main" val="1"/>
+                <p16:designElem xmlns:p16="http://schemas.microsoft.com/office/powerpoint/2015/main" xmlns="" val="1"/>
               </p:ext>
             </p:extLst>
           </p:nvPr>
@@ -5042,8 +5042,8 @@
         </p:blipFill>
         <p:spPr>
           <a:xfrm>
-            <a:off x="3472071" y="0"/>
-            <a:ext cx="8719930" cy="6858000"/>
+            <a:off x="3472071" y="477988"/>
+            <a:ext cx="8719930" cy="5902023"/>
           </a:xfrm>
         </p:spPr>
       </p:pic>
@@ -5180,7 +5180,7 @@
           <p:cNvPr id="21" name="Content Placeholder 20">
             <a:extLst>
               <a:ext uri="{FF2B5EF4-FFF2-40B4-BE49-F238E27FC236}">
-                <a16:creationId xmlns:a16="http://schemas.microsoft.com/office/drawing/2014/main" id="{331E4DC8-86C2-4525-8396-472B086B96A4}"/>
+                <a16:creationId xmlns:a16="http://schemas.microsoft.com/office/drawing/2014/main" xmlns="" id="{331E4DC8-86C2-4525-8396-472B086B96A4}"/>
               </a:ext>
             </a:extLst>
           </p:cNvPr>
@@ -5257,7 +5257,7 @@
           <p:cNvPr id="14" name="Content Placeholder 13" descr="A screenshot of text&#10;&#10;Description automatically generated">
             <a:extLst>
               <a:ext uri="{FF2B5EF4-FFF2-40B4-BE49-F238E27FC236}">
-                <a16:creationId xmlns:a16="http://schemas.microsoft.com/office/drawing/2014/main" id="{054B6262-BEBE-47E2-89B2-BEA264C1EDD3}"/>
+                <a16:creationId xmlns:a16="http://schemas.microsoft.com/office/drawing/2014/main" xmlns="" id="{054B6262-BEBE-47E2-89B2-BEA264C1EDD3}"/>
               </a:ext>
             </a:extLst>
           </p:cNvPr>
@@ -5516,10 +5516,10 @@
           <p:cNvPr id="10" name="Rectangle 9">
             <a:extLst>
               <a:ext uri="{FF2B5EF4-FFF2-40B4-BE49-F238E27FC236}">
-                <a16:creationId xmlns:a16="http://schemas.microsoft.com/office/drawing/2014/main" id="{474A7FC5-56F0-4FE3-8383-04EE92963F2A}"/>
+                <a16:creationId xmlns:a16="http://schemas.microsoft.com/office/drawing/2014/main" xmlns="" id="{474A7FC5-56F0-4FE3-8383-04EE92963F2A}"/>
               </a:ext>
               <a:ext uri="{C183D7F6-B498-43B3-948B-1728B52AA6E4}">
-                <adec:decorative xmlns:adec="http://schemas.microsoft.com/office/drawing/2017/decorative" val="1"/>
+                <adec:decorative xmlns:adec="http://schemas.microsoft.com/office/drawing/2017/decorative" xmlns="" val="1"/>
               </a:ext>
             </a:extLst>
           </p:cNvPr>
@@ -5529,7 +5529,7 @@
           <p:nvPr>
             <p:extLst>
               <p:ext uri="{386F3935-93C4-4BCD-93E2-E3B085C9AB24}">
-                <p16:designElem xmlns:p16="http://schemas.microsoft.com/office/powerpoint/2015/main" val="1"/>
+                <p16:designElem xmlns:p16="http://schemas.microsoft.com/office/powerpoint/2015/main" xmlns="" val="1"/>
               </p:ext>
             </p:extLst>
           </p:nvPr>
@@ -5576,7 +5576,7 @@
           <p:cNvPr id="5" name="Picture 4" descr="Working">
             <a:extLst>
               <a:ext uri="{FF2B5EF4-FFF2-40B4-BE49-F238E27FC236}">
-                <a16:creationId xmlns:a16="http://schemas.microsoft.com/office/drawing/2014/main" id="{BC829010-59E7-4B6E-AE76-EEE7D0ED0D81}"/>
+                <a16:creationId xmlns:a16="http://schemas.microsoft.com/office/drawing/2014/main" xmlns="" id="{BC829010-59E7-4B6E-AE76-EEE7D0ED0D81}"/>
               </a:ext>
             </a:extLst>
           </p:cNvPr>
@@ -5611,10 +5611,10 @@
           <p:cNvPr id="12" name="Rectangle 11">
             <a:extLst>
               <a:ext uri="{FF2B5EF4-FFF2-40B4-BE49-F238E27FC236}">
-                <a16:creationId xmlns:a16="http://schemas.microsoft.com/office/drawing/2014/main" id="{DE6BEBC3-6A99-4A53-9835-9875E08415A6}"/>
+                <a16:creationId xmlns:a16="http://schemas.microsoft.com/office/drawing/2014/main" xmlns="" id="{DE6BEBC3-6A99-4A53-9835-9875E08415A6}"/>
               </a:ext>
               <a:ext uri="{C183D7F6-B498-43B3-948B-1728B52AA6E4}">
-                <adec:decorative xmlns:adec="http://schemas.microsoft.com/office/drawing/2017/decorative" val="1"/>
+                <adec:decorative xmlns:adec="http://schemas.microsoft.com/office/drawing/2017/decorative" xmlns="" val="1"/>
               </a:ext>
             </a:extLst>
           </p:cNvPr>
@@ -5624,7 +5624,7 @@
           <p:nvPr>
             <p:extLst>
               <p:ext uri="{386F3935-93C4-4BCD-93E2-E3B085C9AB24}">
-                <p16:designElem xmlns:p16="http://schemas.microsoft.com/office/powerpoint/2015/main" val="1"/>
+                <p16:designElem xmlns:p16="http://schemas.microsoft.com/office/powerpoint/2015/main" xmlns="" val="1"/>
               </p:ext>
             </p:extLst>
           </p:nvPr>
@@ -5668,7 +5668,7 @@
           <p:cNvPr id="2" name="Title 1">
             <a:extLst>
               <a:ext uri="{FF2B5EF4-FFF2-40B4-BE49-F238E27FC236}">
-                <a16:creationId xmlns:a16="http://schemas.microsoft.com/office/drawing/2014/main" id="{F993299F-3E8A-4BF7-9C3D-B9F22CF94C4E}"/>
+                <a16:creationId xmlns:a16="http://schemas.microsoft.com/office/drawing/2014/main" xmlns="" id="{F993299F-3E8A-4BF7-9C3D-B9F22CF94C4E}"/>
               </a:ext>
             </a:extLst>
           </p:cNvPr>
@@ -5703,10 +5703,10 @@
           <p:cNvPr id="14" name="Rectangle 13">
             <a:extLst>
               <a:ext uri="{FF2B5EF4-FFF2-40B4-BE49-F238E27FC236}">
-                <a16:creationId xmlns:a16="http://schemas.microsoft.com/office/drawing/2014/main" id="{D1006911-EDB8-4CDF-AEAA-A3FA060851F3}"/>
+                <a16:creationId xmlns:a16="http://schemas.microsoft.com/office/drawing/2014/main" xmlns="" id="{D1006911-EDB8-4CDF-AEAA-A3FA060851F3}"/>
               </a:ext>
               <a:ext uri="{C183D7F6-B498-43B3-948B-1728B52AA6E4}">
-                <adec:decorative xmlns:adec="http://schemas.microsoft.com/office/drawing/2017/decorative" val="1"/>
+                <adec:decorative xmlns:adec="http://schemas.microsoft.com/office/drawing/2017/decorative" xmlns="" val="1"/>
               </a:ext>
             </a:extLst>
           </p:cNvPr>
@@ -5716,7 +5716,7 @@
           <p:nvPr>
             <p:extLst>
               <p:ext uri="{386F3935-93C4-4BCD-93E2-E3B085C9AB24}">
-                <p16:designElem xmlns:p16="http://schemas.microsoft.com/office/powerpoint/2015/main" val="1"/>
+                <p16:designElem xmlns:p16="http://schemas.microsoft.com/office/powerpoint/2015/main" xmlns="" val="1"/>
               </p:ext>
             </p:extLst>
           </p:nvPr>
@@ -6000,6 +6000,23 @@
 </file>
 
 <file path=customXml/item1.xml><?xml version="1.0" encoding="utf-8"?>
+<p:properties xmlns:p="http://schemas.microsoft.com/office/2006/metadata/properties" xmlns:xsi="http://www.w3.org/2001/XMLSchema-instance" xmlns:pc="http://schemas.microsoft.com/office/infopath/2007/PartnerControls">
+  <documentManagement>
+    <MediaServiceKeyPoints xmlns="71af3243-3dd4-4a8d-8c0d-dd76da1f02a5" xsi:nil="true"/>
+  </documentManagement>
+</p:properties>
+</file>
+
+<file path=customXml/item2.xml><?xml version="1.0" encoding="utf-8"?>
+<?mso-contentType ?>
+<FormTemplates xmlns="http://schemas.microsoft.com/sharepoint/v3/contenttype/forms">
+  <Display>DocumentLibraryForm</Display>
+  <Edit>DocumentLibraryForm</Edit>
+  <New>DocumentLibraryForm</New>
+</FormTemplates>
+</file>
+
+<file path=customXml/item3.xml><?xml version="1.0" encoding="utf-8"?>
 <ct:contentTypeSchema xmlns:ct="http://schemas.microsoft.com/office/2006/metadata/contentType" xmlns:ma="http://schemas.microsoft.com/office/2006/metadata/properties/metaAttributes" ct:_="" ma:_="" ma:contentTypeName="Document" ma:contentTypeID="0x01010079F111ED35F8CC479449609E8A0923A6" ma:contentTypeVersion="11" ma:contentTypeDescription="Create a new document." ma:contentTypeScope="" ma:versionID="1c2eb7a32e66fb6e4260f3771546a5e2">
   <xsd:schema xmlns:xsd="http://www.w3.org/2001/XMLSchema" xmlns:xs="http://www.w3.org/2001/XMLSchema" xmlns:p="http://schemas.microsoft.com/office/2006/metadata/properties" xmlns:ns2="71af3243-3dd4-4a8d-8c0d-dd76da1f02a5" xmlns:ns3="16c05727-aa75-4e4a-9b5f-8a80a1165891" targetNamespace="http://schemas.microsoft.com/office/2006/metadata/properties" ma:root="true" ma:fieldsID="04e1f6479c48b08974ba73b5ca973489" ns2:_="" ns3:_="">
     <xsd:import namespace="71af3243-3dd4-4a8d-8c0d-dd76da1f02a5"/>
@@ -6210,24 +6227,32 @@
 </ct:contentTypeSchema>
 </file>
 
-<file path=customXml/item2.xml><?xml version="1.0" encoding="utf-8"?>
-<?mso-contentType ?>
-<FormTemplates xmlns="http://schemas.microsoft.com/sharepoint/v3/contenttype/forms">
-  <Display>DocumentLibraryForm</Display>
-  <Edit>DocumentLibraryForm</Edit>
-  <New>DocumentLibraryForm</New>
-</FormTemplates>
+<file path=customXml/itemProps1.xml><?xml version="1.0" encoding="utf-8"?>
+<ds:datastoreItem xmlns:ds="http://schemas.openxmlformats.org/officeDocument/2006/customXml" ds:itemID="{30541854-87B3-4953-A183-EF3BD285377B}">
+  <ds:schemaRefs>
+    <ds:schemaRef ds:uri="http://schemas.openxmlformats.org/package/2006/metadata/core-properties"/>
+    <ds:schemaRef ds:uri="16c05727-aa75-4e4a-9b5f-8a80a1165891"/>
+    <ds:schemaRef ds:uri="http://purl.org/dc/dcmitype/"/>
+    <ds:schemaRef ds:uri="http://schemas.microsoft.com/office/infopath/2007/PartnerControls"/>
+    <ds:schemaRef ds:uri="http://schemas.microsoft.com/office/2006/documentManagement/types"/>
+    <ds:schemaRef ds:uri="http://purl.org/dc/elements/1.1/"/>
+    <ds:schemaRef ds:uri="http://schemas.microsoft.com/office/2006/metadata/properties"/>
+    <ds:schemaRef ds:uri="http://purl.org/dc/terms/"/>
+    <ds:schemaRef ds:uri="71af3243-3dd4-4a8d-8c0d-dd76da1f02a5"/>
+    <ds:schemaRef ds:uri="http://www.w3.org/XML/1998/namespace"/>
+  </ds:schemaRefs>
+</ds:datastoreItem>
 </file>
 
-<file path=customXml/item3.xml><?xml version="1.0" encoding="utf-8"?>
-<p:properties xmlns:p="http://schemas.microsoft.com/office/2006/metadata/properties" xmlns:xsi="http://www.w3.org/2001/XMLSchema-instance" xmlns:pc="http://schemas.microsoft.com/office/infopath/2007/PartnerControls">
-  <documentManagement>
-    <MediaServiceKeyPoints xmlns="71af3243-3dd4-4a8d-8c0d-dd76da1f02a5" xsi:nil="true"/>
-  </documentManagement>
-</p:properties>
+<file path=customXml/itemProps2.xml><?xml version="1.0" encoding="utf-8"?>
+<ds:datastoreItem xmlns:ds="http://schemas.openxmlformats.org/officeDocument/2006/customXml" ds:itemID="{DFB9BFA2-1FA5-44A1-B975-10D6BF58ECD0}">
+  <ds:schemaRefs>
+    <ds:schemaRef ds:uri="http://schemas.microsoft.com/sharepoint/v3/contenttype/forms"/>
+  </ds:schemaRefs>
+</ds:datastoreItem>
 </file>
 
-<file path=customXml/itemProps1.xml><?xml version="1.0" encoding="utf-8"?>
+<file path=customXml/itemProps3.xml><?xml version="1.0" encoding="utf-8"?>
 <ds:datastoreItem xmlns:ds="http://schemas.openxmlformats.org/officeDocument/2006/customXml" ds:itemID="{E577E783-5AB8-45E6-9E56-AE40075231B2}">
   <ds:schemaRefs>
     <ds:schemaRef ds:uri="http://schemas.microsoft.com/office/2006/metadata/contentType"/>
@@ -6244,29 +6269,4 @@
     <ds:schemaRef ds:uri="http://schemas.microsoft.com/internal/obd"/>
   </ds:schemaRefs>
 </ds:datastoreItem>
-</file>
-
-<file path=customXml/itemProps2.xml><?xml version="1.0" encoding="utf-8"?>
-<ds:datastoreItem xmlns:ds="http://schemas.openxmlformats.org/officeDocument/2006/customXml" ds:itemID="{DFB9BFA2-1FA5-44A1-B975-10D6BF58ECD0}">
-  <ds:schemaRefs>
-    <ds:schemaRef ds:uri="http://schemas.microsoft.com/sharepoint/v3/contenttype/forms"/>
-  </ds:schemaRefs>
-</ds:datastoreItem>
-</file>
-
-<file path=customXml/itemProps3.xml><?xml version="1.0" encoding="utf-8"?>
-<ds:datastoreItem xmlns:ds="http://schemas.openxmlformats.org/officeDocument/2006/customXml" ds:itemID="{30541854-87B3-4953-A183-EF3BD285377B}">
-  <ds:schemaRefs>
-    <ds:schemaRef ds:uri="http://schemas.openxmlformats.org/package/2006/metadata/core-properties"/>
-    <ds:schemaRef ds:uri="16c05727-aa75-4e4a-9b5f-8a80a1165891"/>
-    <ds:schemaRef ds:uri="http://purl.org/dc/dcmitype/"/>
-    <ds:schemaRef ds:uri="http://schemas.microsoft.com/office/infopath/2007/PartnerControls"/>
-    <ds:schemaRef ds:uri="http://schemas.microsoft.com/office/2006/documentManagement/types"/>
-    <ds:schemaRef ds:uri="http://purl.org/dc/elements/1.1/"/>
-    <ds:schemaRef ds:uri="http://schemas.microsoft.com/office/2006/metadata/properties"/>
-    <ds:schemaRef ds:uri="http://purl.org/dc/terms/"/>
-    <ds:schemaRef ds:uri="71af3243-3dd4-4a8d-8c0d-dd76da1f02a5"/>
-    <ds:schemaRef ds:uri="http://www.w3.org/XML/1998/namespace"/>
-  </ds:schemaRefs>
-</ds:datastoreItem>
 </file>
</xml_diff>

<commit_message>
Updated codes for RQ5's EDA and imgaes in the screencast presentation
</commit_message>
<xml_diff>
--- a/Screencast_Presentation.pptx
+++ b/Screencast_Presentation.pptx
@@ -344,7 +344,7 @@
             <a:fld id="{5586B75A-687E-405C-8A0B-8D00578BA2C3}" type="datetimeFigureOut">
               <a:rPr lang="en-US" smtClean="0"/>
               <a:pPr/>
-              <a:t>1/10/2019</a:t>
+              <a:t>1/13/2019</a:t>
             </a:fld>
             <a:endParaRPr lang="en-US" dirty="0"/>
           </a:p>
@@ -516,7 +516,7 @@
             <a:fld id="{5586B75A-687E-405C-8A0B-8D00578BA2C3}" type="datetimeFigureOut">
               <a:rPr lang="en-US" smtClean="0"/>
               <a:pPr/>
-              <a:t>1/10/2019</a:t>
+              <a:t>1/13/2019</a:t>
             </a:fld>
             <a:endParaRPr lang="en-US" dirty="0"/>
           </a:p>
@@ -698,7 +698,7 @@
             <a:fld id="{5586B75A-687E-405C-8A0B-8D00578BA2C3}" type="datetimeFigureOut">
               <a:rPr lang="en-US" smtClean="0"/>
               <a:pPr/>
-              <a:t>1/10/2019</a:t>
+              <a:t>1/13/2019</a:t>
             </a:fld>
             <a:endParaRPr lang="en-US" dirty="0"/>
           </a:p>
@@ -870,7 +870,7 @@
             <a:fld id="{5586B75A-687E-405C-8A0B-8D00578BA2C3}" type="datetimeFigureOut">
               <a:rPr lang="en-US" smtClean="0"/>
               <a:pPr/>
-              <a:t>1/10/2019</a:t>
+              <a:t>1/13/2019</a:t>
             </a:fld>
             <a:endParaRPr lang="en-US" dirty="0"/>
           </a:p>
@@ -1126,7 +1126,7 @@
             <a:fld id="{5586B75A-687E-405C-8A0B-8D00578BA2C3}" type="datetimeFigureOut">
               <a:rPr lang="en-US" smtClean="0"/>
               <a:pPr/>
-              <a:t>1/10/2019</a:t>
+              <a:t>1/13/2019</a:t>
             </a:fld>
             <a:endParaRPr lang="en-US" dirty="0"/>
           </a:p>
@@ -1416,7 +1416,7 @@
             <a:fld id="{5586B75A-687E-405C-8A0B-8D00578BA2C3}" type="datetimeFigureOut">
               <a:rPr lang="en-US" smtClean="0"/>
               <a:pPr/>
-              <a:t>1/10/2019</a:t>
+              <a:t>1/13/2019</a:t>
             </a:fld>
             <a:endParaRPr lang="en-US" dirty="0"/>
           </a:p>
@@ -1860,7 +1860,7 @@
             <a:fld id="{5586B75A-687E-405C-8A0B-8D00578BA2C3}" type="datetimeFigureOut">
               <a:rPr lang="en-US" smtClean="0"/>
               <a:pPr/>
-              <a:t>1/10/2019</a:t>
+              <a:t>1/13/2019</a:t>
             </a:fld>
             <a:endParaRPr lang="en-US" dirty="0"/>
           </a:p>
@@ -1980,7 +1980,7 @@
             <a:fld id="{5586B75A-687E-405C-8A0B-8D00578BA2C3}" type="datetimeFigureOut">
               <a:rPr lang="en-US" smtClean="0"/>
               <a:pPr/>
-              <a:t>1/10/2019</a:t>
+              <a:t>1/13/2019</a:t>
             </a:fld>
             <a:endParaRPr lang="en-US" dirty="0"/>
           </a:p>
@@ -2077,7 +2077,7 @@
             <a:fld id="{5586B75A-687E-405C-8A0B-8D00578BA2C3}" type="datetimeFigureOut">
               <a:rPr lang="en-US" smtClean="0"/>
               <a:pPr/>
-              <a:t>1/10/2019</a:t>
+              <a:t>1/13/2019</a:t>
             </a:fld>
             <a:endParaRPr lang="en-US" dirty="0"/>
           </a:p>
@@ -2367,7 +2367,7 @@
             <a:fld id="{5586B75A-687E-405C-8A0B-8D00578BA2C3}" type="datetimeFigureOut">
               <a:rPr lang="en-US" smtClean="0"/>
               <a:pPr/>
-              <a:t>1/10/2019</a:t>
+              <a:t>1/13/2019</a:t>
             </a:fld>
             <a:endParaRPr lang="en-US" dirty="0"/>
           </a:p>
@@ -2421,7 +2421,7 @@
           <p:cNvPr id="11" name="Content Placeholder 2">
             <a:extLst>
               <a:ext uri="{FF2B5EF4-FFF2-40B4-BE49-F238E27FC236}">
-                <a16:creationId xmlns:a16="http://schemas.microsoft.com/office/drawing/2014/main" xmlns="" id="{87B0DF2F-DAFD-4616-9E25-0C28D75BF306}"/>
+                <a16:creationId xmlns:a16="http://schemas.microsoft.com/office/drawing/2014/main" id="{87B0DF2F-DAFD-4616-9E25-0C28D75BF306}"/>
               </a:ext>
             </a:extLst>
           </p:cNvPr>
@@ -2512,7 +2512,7 @@
           <p:cNvPr id="12" name="Content Placeholder 2">
             <a:extLst>
               <a:ext uri="{FF2B5EF4-FFF2-40B4-BE49-F238E27FC236}">
-                <a16:creationId xmlns:a16="http://schemas.microsoft.com/office/drawing/2014/main" xmlns="" id="{336DA0F9-D851-437C-A45B-EC125A3D3DB3}"/>
+                <a16:creationId xmlns:a16="http://schemas.microsoft.com/office/drawing/2014/main" id="{336DA0F9-D851-437C-A45B-EC125A3D3DB3}"/>
               </a:ext>
             </a:extLst>
           </p:cNvPr>
@@ -2603,7 +2603,7 @@
           <p:cNvPr id="6" name="Text Placeholder 5">
             <a:extLst>
               <a:ext uri="{FF2B5EF4-FFF2-40B4-BE49-F238E27FC236}">
-                <a16:creationId xmlns:a16="http://schemas.microsoft.com/office/drawing/2014/main" xmlns="" id="{0FF0BA98-3AB4-4D88-B1C2-6279BCACFAD9}"/>
+                <a16:creationId xmlns:a16="http://schemas.microsoft.com/office/drawing/2014/main" id="{0FF0BA98-3AB4-4D88-B1C2-6279BCACFAD9}"/>
               </a:ext>
             </a:extLst>
           </p:cNvPr>
@@ -2665,7 +2665,7 @@
           <p:cNvPr id="13" name="Text Placeholder 5">
             <a:extLst>
               <a:ext uri="{FF2B5EF4-FFF2-40B4-BE49-F238E27FC236}">
-                <a16:creationId xmlns:a16="http://schemas.microsoft.com/office/drawing/2014/main" xmlns="" id="{D9DEF72B-B924-4A0D-8C83-3B370632C0D3}"/>
+                <a16:creationId xmlns:a16="http://schemas.microsoft.com/office/drawing/2014/main" id="{D9DEF72B-B924-4A0D-8C83-3B370632C0D3}"/>
               </a:ext>
             </a:extLst>
           </p:cNvPr>
@@ -2728,7 +2728,7 @@
           <p:cNvPr id="14" name="Text Placeholder 5">
             <a:extLst>
               <a:ext uri="{FF2B5EF4-FFF2-40B4-BE49-F238E27FC236}">
-                <a16:creationId xmlns:a16="http://schemas.microsoft.com/office/drawing/2014/main" xmlns="" id="{E9D30C54-E9E8-4300-8DA4-352DB3A71A4F}"/>
+                <a16:creationId xmlns:a16="http://schemas.microsoft.com/office/drawing/2014/main" id="{E9D30C54-E9E8-4300-8DA4-352DB3A71A4F}"/>
               </a:ext>
             </a:extLst>
           </p:cNvPr>
@@ -3011,7 +3011,7 @@
             <a:fld id="{5586B75A-687E-405C-8A0B-8D00578BA2C3}" type="datetimeFigureOut">
               <a:rPr lang="en-US" smtClean="0"/>
               <a:pPr/>
-              <a:t>1/10/2019</a:t>
+              <a:t>1/13/2019</a:t>
             </a:fld>
             <a:endParaRPr lang="en-US" dirty="0"/>
           </a:p>
@@ -3310,7 +3310,7 @@
             <a:fld id="{5586B75A-687E-405C-8A0B-8D00578BA2C3}" type="datetimeFigureOut">
               <a:rPr lang="en-US" smtClean="0"/>
               <a:pPr/>
-              <a:t>1/10/2019</a:t>
+              <a:t>1/13/2019</a:t>
             </a:fld>
             <a:endParaRPr lang="en-US" dirty="0"/>
           </a:p>
@@ -3799,10 +3799,10 @@
           <p:cNvPr id="10" name="Rectangle 9">
             <a:extLst>
               <a:ext uri="{FF2B5EF4-FFF2-40B4-BE49-F238E27FC236}">
-                <a16:creationId xmlns:a16="http://schemas.microsoft.com/office/drawing/2014/main" xmlns="" id="{8869841E-71E7-4F51-8E6F-5E8A5E375653}"/>
+                <a16:creationId xmlns:a16="http://schemas.microsoft.com/office/drawing/2014/main" id="{8869841E-71E7-4F51-8E6F-5E8A5E375653}"/>
               </a:ext>
               <a:ext uri="{C183D7F6-B498-43B3-948B-1728B52AA6E4}">
-                <adec:decorative xmlns:adec="http://schemas.microsoft.com/office/drawing/2017/decorative" xmlns="" val="1"/>
+                <adec:decorative xmlns:adec="http://schemas.microsoft.com/office/drawing/2017/decorative" val="1"/>
               </a:ext>
             </a:extLst>
           </p:cNvPr>
@@ -3812,7 +3812,7 @@
           <p:nvPr>
             <p:extLst>
               <p:ext uri="{386F3935-93C4-4BCD-93E2-E3B085C9AB24}">
-                <p16:designElem xmlns:p16="http://schemas.microsoft.com/office/powerpoint/2015/main" xmlns="" val="1"/>
+                <p16:designElem xmlns:p16="http://schemas.microsoft.com/office/powerpoint/2015/main" val="1"/>
               </p:ext>
             </p:extLst>
           </p:nvPr>
@@ -3859,7 +3859,7 @@
           <p:cNvPr id="5" name="Picture 4">
             <a:extLst>
               <a:ext uri="{FF2B5EF4-FFF2-40B4-BE49-F238E27FC236}">
-                <a16:creationId xmlns:a16="http://schemas.microsoft.com/office/drawing/2014/main" xmlns="" id="{A3A2E0DA-DA21-447D-AD1F-3DB915DD051B}"/>
+                <a16:creationId xmlns:a16="http://schemas.microsoft.com/office/drawing/2014/main" id="{A3A2E0DA-DA21-447D-AD1F-3DB915DD051B}"/>
               </a:ext>
             </a:extLst>
           </p:cNvPr>
@@ -3895,10 +3895,10 @@
           <p:cNvPr id="12" name="Rectangle 11">
             <a:extLst>
               <a:ext uri="{FF2B5EF4-FFF2-40B4-BE49-F238E27FC236}">
-                <a16:creationId xmlns:a16="http://schemas.microsoft.com/office/drawing/2014/main" xmlns="" id="{594B067E-A161-4B29-A8FA-FEEB1944952A}"/>
+                <a16:creationId xmlns:a16="http://schemas.microsoft.com/office/drawing/2014/main" id="{594B067E-A161-4B29-A8FA-FEEB1944952A}"/>
               </a:ext>
               <a:ext uri="{C183D7F6-B498-43B3-948B-1728B52AA6E4}">
-                <adec:decorative xmlns:adec="http://schemas.microsoft.com/office/drawing/2017/decorative" xmlns="" val="1"/>
+                <adec:decorative xmlns:adec="http://schemas.microsoft.com/office/drawing/2017/decorative" val="1"/>
               </a:ext>
             </a:extLst>
           </p:cNvPr>
@@ -3908,7 +3908,7 @@
           <p:nvPr>
             <p:extLst>
               <p:ext uri="{386F3935-93C4-4BCD-93E2-E3B085C9AB24}">
-                <p16:designElem xmlns:p16="http://schemas.microsoft.com/office/powerpoint/2015/main" xmlns="" val="1"/>
+                <p16:designElem xmlns:p16="http://schemas.microsoft.com/office/powerpoint/2015/main" val="1"/>
               </p:ext>
             </p:extLst>
           </p:nvPr>
@@ -3950,7 +3950,7 @@
           <p:cNvPr id="2" name="Title 1">
             <a:extLst>
               <a:ext uri="{FF2B5EF4-FFF2-40B4-BE49-F238E27FC236}">
-                <a16:creationId xmlns:a16="http://schemas.microsoft.com/office/drawing/2014/main" xmlns="" id="{7D6CA50C-1A88-4B3F-A34F-FE199F4205A2}"/>
+                <a16:creationId xmlns:a16="http://schemas.microsoft.com/office/drawing/2014/main" id="{7D6CA50C-1A88-4B3F-A34F-FE199F4205A2}"/>
               </a:ext>
             </a:extLst>
           </p:cNvPr>
@@ -4023,10 +4023,10 @@
           <p:cNvPr id="10" name="Rectangle 9">
             <a:extLst>
               <a:ext uri="{FF2B5EF4-FFF2-40B4-BE49-F238E27FC236}">
-                <a16:creationId xmlns:a16="http://schemas.microsoft.com/office/drawing/2014/main" xmlns="" id="{DA178560-78C9-4CB5-BE46-05302CDA8E98}"/>
+                <a16:creationId xmlns:a16="http://schemas.microsoft.com/office/drawing/2014/main" id="{DA178560-78C9-4CB5-BE46-05302CDA8E98}"/>
               </a:ext>
               <a:ext uri="{C183D7F6-B498-43B3-948B-1728B52AA6E4}">
-                <adec:decorative xmlns:adec="http://schemas.microsoft.com/office/drawing/2017/decorative" xmlns="" val="1"/>
+                <adec:decorative xmlns:adec="http://schemas.microsoft.com/office/drawing/2017/decorative" val="1"/>
               </a:ext>
             </a:extLst>
           </p:cNvPr>
@@ -4036,7 +4036,7 @@
           <p:nvPr>
             <p:extLst>
               <p:ext uri="{386F3935-93C4-4BCD-93E2-E3B085C9AB24}">
-                <p16:designElem xmlns:p16="http://schemas.microsoft.com/office/powerpoint/2015/main" xmlns="" val="1"/>
+                <p16:designElem xmlns:p16="http://schemas.microsoft.com/office/powerpoint/2015/main" val="1"/>
               </p:ext>
             </p:extLst>
           </p:nvPr>
@@ -4083,7 +4083,7 @@
           <p:cNvPr id="5" name="Picture 4" descr="multiple people looking at blueprints&#10;">
             <a:extLst>
               <a:ext uri="{FF2B5EF4-FFF2-40B4-BE49-F238E27FC236}">
-                <a16:creationId xmlns:a16="http://schemas.microsoft.com/office/drawing/2014/main" xmlns="" id="{DC582F7A-0108-4267-A3E3-CA43CDA209C6}"/>
+                <a16:creationId xmlns:a16="http://schemas.microsoft.com/office/drawing/2014/main" id="{DC582F7A-0108-4267-A3E3-CA43CDA209C6}"/>
               </a:ext>
             </a:extLst>
           </p:cNvPr>
@@ -4112,10 +4112,10 @@
           <p:cNvPr id="12" name="Rectangle 11">
             <a:extLst>
               <a:ext uri="{FF2B5EF4-FFF2-40B4-BE49-F238E27FC236}">
-                <a16:creationId xmlns:a16="http://schemas.microsoft.com/office/drawing/2014/main" xmlns="" id="{69461EC9-A94F-4225-B526-5C862F340FB6}"/>
+                <a16:creationId xmlns:a16="http://schemas.microsoft.com/office/drawing/2014/main" id="{69461EC9-A94F-4225-B526-5C862F340FB6}"/>
               </a:ext>
               <a:ext uri="{C183D7F6-B498-43B3-948B-1728B52AA6E4}">
-                <adec:decorative xmlns:adec="http://schemas.microsoft.com/office/drawing/2017/decorative" xmlns="" val="1"/>
+                <adec:decorative xmlns:adec="http://schemas.microsoft.com/office/drawing/2017/decorative" val="1"/>
               </a:ext>
             </a:extLst>
           </p:cNvPr>
@@ -4125,7 +4125,7 @@
           <p:nvPr>
             <p:extLst>
               <p:ext uri="{386F3935-93C4-4BCD-93E2-E3B085C9AB24}">
-                <p16:designElem xmlns:p16="http://schemas.microsoft.com/office/powerpoint/2015/main" xmlns="" val="1"/>
+                <p16:designElem xmlns:p16="http://schemas.microsoft.com/office/powerpoint/2015/main" val="1"/>
               </p:ext>
             </p:extLst>
           </p:nvPr>
@@ -4167,7 +4167,7 @@
           <p:cNvPr id="2" name="Title 1">
             <a:extLst>
               <a:ext uri="{FF2B5EF4-FFF2-40B4-BE49-F238E27FC236}">
-                <a16:creationId xmlns:a16="http://schemas.microsoft.com/office/drawing/2014/main" xmlns="" id="{28492750-E12D-4995-ABCB-5BB846060890}"/>
+                <a16:creationId xmlns:a16="http://schemas.microsoft.com/office/drawing/2014/main" id="{28492750-E12D-4995-ABCB-5BB846060890}"/>
               </a:ext>
             </a:extLst>
           </p:cNvPr>
@@ -4202,10 +4202,10 @@
           <p:cNvPr id="14" name="Rectangle 13">
             <a:extLst>
               <a:ext uri="{FF2B5EF4-FFF2-40B4-BE49-F238E27FC236}">
-                <a16:creationId xmlns:a16="http://schemas.microsoft.com/office/drawing/2014/main" xmlns="" id="{D87160F7-FCB2-48B7-8BB8-BEFF45F6BF18}"/>
+                <a16:creationId xmlns:a16="http://schemas.microsoft.com/office/drawing/2014/main" id="{D87160F7-FCB2-48B7-8BB8-BEFF45F6BF18}"/>
               </a:ext>
               <a:ext uri="{C183D7F6-B498-43B3-948B-1728B52AA6E4}">
-                <adec:decorative xmlns:adec="http://schemas.microsoft.com/office/drawing/2017/decorative" xmlns="" val="1"/>
+                <adec:decorative xmlns:adec="http://schemas.microsoft.com/office/drawing/2017/decorative" val="1"/>
               </a:ext>
             </a:extLst>
           </p:cNvPr>
@@ -4215,7 +4215,7 @@
           <p:nvPr>
             <p:extLst>
               <p:ext uri="{386F3935-93C4-4BCD-93E2-E3B085C9AB24}">
-                <p16:designElem xmlns:p16="http://schemas.microsoft.com/office/powerpoint/2015/main" xmlns="" val="1"/>
+                <p16:designElem xmlns:p16="http://schemas.microsoft.com/office/powerpoint/2015/main" val="1"/>
               </p:ext>
             </p:extLst>
           </p:nvPr>
@@ -4259,10 +4259,10 @@
           <p:cNvPr id="16" name="Rectangle 15">
             <a:extLst>
               <a:ext uri="{FF2B5EF4-FFF2-40B4-BE49-F238E27FC236}">
-                <a16:creationId xmlns:a16="http://schemas.microsoft.com/office/drawing/2014/main" xmlns="" id="{E9282B84-621E-4580-80B7-222118AE446D}"/>
+                <a16:creationId xmlns:a16="http://schemas.microsoft.com/office/drawing/2014/main" id="{E9282B84-621E-4580-80B7-222118AE446D}"/>
               </a:ext>
               <a:ext uri="{C183D7F6-B498-43B3-948B-1728B52AA6E4}">
-                <adec:decorative xmlns:adec="http://schemas.microsoft.com/office/drawing/2017/decorative" xmlns="" val="1"/>
+                <adec:decorative xmlns:adec="http://schemas.microsoft.com/office/drawing/2017/decorative" val="1"/>
               </a:ext>
             </a:extLst>
           </p:cNvPr>
@@ -4272,7 +4272,7 @@
           <p:nvPr>
             <p:extLst>
               <p:ext uri="{386F3935-93C4-4BCD-93E2-E3B085C9AB24}">
-                <p16:designElem xmlns:p16="http://schemas.microsoft.com/office/powerpoint/2015/main" xmlns="" val="1"/>
+                <p16:designElem xmlns:p16="http://schemas.microsoft.com/office/powerpoint/2015/main" val="1"/>
               </p:ext>
             </p:extLst>
           </p:nvPr>
@@ -5087,37 +5087,55 @@
             <p:ph type="title"/>
           </p:nvPr>
         </p:nvSpPr>
-        <p:spPr/>
+        <p:spPr>
+          <a:xfrm>
+            <a:off x="252919" y="1123837"/>
+            <a:ext cx="2947482" cy="4601183"/>
+          </a:xfrm>
+        </p:spPr>
         <p:txBody>
           <a:bodyPr/>
           <a:lstStyle/>
           <a:p>
             <a:r>
               <a:rPr lang="en-US" dirty="0"/>
-              <a:t>Factors for the long distance travel</a:t>
-            </a:r>
-          </a:p>
-        </p:txBody>
-      </p:sp>
-      <p:sp>
-        <p:nvSpPr>
-          <p:cNvPr id="3" name="Content Placeholder 2"/>
-          <p:cNvSpPr>
-            <a:spLocks noGrp="1"/>
-          </p:cNvSpPr>
+              <a:t>Factors affecting customer's decision while choosing most preferred shop</a:t>
+            </a:r>
+          </a:p>
+        </p:txBody>
+      </p:sp>
+      <p:pic>
+        <p:nvPicPr>
+          <p:cNvPr id="4" name="Picture 4" descr="A screenshot of a cell phone&#10;&#10;Description generated with very high confidence">
+            <a:extLst>
+              <a:ext uri="{FF2B5EF4-FFF2-40B4-BE49-F238E27FC236}">
+                <a16:creationId xmlns:a16="http://schemas.microsoft.com/office/drawing/2014/main" id="{556E9E64-36AA-4F6A-848D-E06E9AEFE627}"/>
+              </a:ext>
+            </a:extLst>
+          </p:cNvPr>
+          <p:cNvPicPr>
+            <a:picLocks noGrp="1" noChangeAspect="1"/>
+          </p:cNvPicPr>
           <p:nvPr>
             <p:ph idx="1"/>
           </p:nvPr>
-        </p:nvSpPr>
-        <p:spPr/>
-        <p:txBody>
-          <a:bodyPr/>
-          <a:lstStyle/>
-          <a:p>
-            <a:endParaRPr lang="en-US" dirty="0"/>
-          </a:p>
-        </p:txBody>
-      </p:sp>
+        </p:nvPicPr>
+        <p:blipFill>
+          <a:blip r:embed="rId2"/>
+          <a:stretch>
+            <a:fillRect/>
+          </a:stretch>
+        </p:blipFill>
+        <p:spPr>
+          <a:xfrm>
+            <a:off x="3942420" y="519052"/>
+            <a:ext cx="8247197" cy="5839507"/>
+          </a:xfrm>
+          <a:prstGeom prst="rect">
+            <a:avLst/>
+          </a:prstGeom>
+        </p:spPr>
+      </p:pic>
     </p:spTree>
     <p:extLst>
       <p:ext uri="{BB962C8B-B14F-4D97-AF65-F5344CB8AC3E}">
@@ -5180,7 +5198,7 @@
           <p:cNvPr id="21" name="Content Placeholder 20">
             <a:extLst>
               <a:ext uri="{FF2B5EF4-FFF2-40B4-BE49-F238E27FC236}">
-                <a16:creationId xmlns:a16="http://schemas.microsoft.com/office/drawing/2014/main" xmlns="" id="{331E4DC8-86C2-4525-8396-472B086B96A4}"/>
+                <a16:creationId xmlns:a16="http://schemas.microsoft.com/office/drawing/2014/main" id="{331E4DC8-86C2-4525-8396-472B086B96A4}"/>
               </a:ext>
             </a:extLst>
           </p:cNvPr>
@@ -5257,7 +5275,7 @@
           <p:cNvPr id="14" name="Content Placeholder 13" descr="A screenshot of text&#10;&#10;Description automatically generated">
             <a:extLst>
               <a:ext uri="{FF2B5EF4-FFF2-40B4-BE49-F238E27FC236}">
-                <a16:creationId xmlns:a16="http://schemas.microsoft.com/office/drawing/2014/main" xmlns="" id="{054B6262-BEBE-47E2-89B2-BEA264C1EDD3}"/>
+                <a16:creationId xmlns:a16="http://schemas.microsoft.com/office/drawing/2014/main" id="{054B6262-BEBE-47E2-89B2-BEA264C1EDD3}"/>
               </a:ext>
             </a:extLst>
           </p:cNvPr>
@@ -5449,30 +5467,43 @@
           <a:p>
             <a:r>
               <a:rPr lang="en-US" dirty="0"/>
-              <a:t>Top 100 profitable customers</a:t>
-            </a:r>
-          </a:p>
-        </p:txBody>
-      </p:sp>
-      <p:sp>
-        <p:nvSpPr>
-          <p:cNvPr id="3" name="Content Placeholder 2"/>
-          <p:cNvSpPr>
-            <a:spLocks noGrp="1"/>
-          </p:cNvSpPr>
+              <a:t>Top 5 customers based on revenue generation</a:t>
+            </a:r>
+          </a:p>
+        </p:txBody>
+      </p:sp>
+      <p:pic>
+        <p:nvPicPr>
+          <p:cNvPr id="4" name="Picture 4" descr="A picture containing stationary, writing implement&#10;&#10;Description generated with high confidence">
+            <a:extLst>
+              <a:ext uri="{FF2B5EF4-FFF2-40B4-BE49-F238E27FC236}">
+                <a16:creationId xmlns:a16="http://schemas.microsoft.com/office/drawing/2014/main" id="{D9D21D56-AB64-4448-BD97-DFC0B1275D74}"/>
+              </a:ext>
+            </a:extLst>
+          </p:cNvPr>
+          <p:cNvPicPr>
+            <a:picLocks noGrp="1" noChangeAspect="1"/>
+          </p:cNvPicPr>
           <p:nvPr>
             <p:ph idx="1"/>
           </p:nvPr>
-        </p:nvSpPr>
-        <p:spPr/>
-        <p:txBody>
-          <a:bodyPr/>
-          <a:lstStyle/>
-          <a:p>
-            <a:endParaRPr lang="en-US" dirty="0"/>
-          </a:p>
-        </p:txBody>
-      </p:sp>
+        </p:nvPicPr>
+        <p:blipFill>
+          <a:blip r:embed="rId2"/>
+          <a:stretch>
+            <a:fillRect/>
+          </a:stretch>
+        </p:blipFill>
+        <p:spPr>
+          <a:xfrm>
+            <a:off x="3640669" y="690485"/>
+            <a:ext cx="8548776" cy="5511018"/>
+          </a:xfrm>
+          <a:prstGeom prst="rect">
+            <a:avLst/>
+          </a:prstGeom>
+        </p:spPr>
+      </p:pic>
     </p:spTree>
     <p:extLst>
       <p:ext uri="{BB962C8B-B14F-4D97-AF65-F5344CB8AC3E}">
@@ -5516,10 +5547,10 @@
           <p:cNvPr id="10" name="Rectangle 9">
             <a:extLst>
               <a:ext uri="{FF2B5EF4-FFF2-40B4-BE49-F238E27FC236}">
-                <a16:creationId xmlns:a16="http://schemas.microsoft.com/office/drawing/2014/main" xmlns="" id="{474A7FC5-56F0-4FE3-8383-04EE92963F2A}"/>
+                <a16:creationId xmlns:a16="http://schemas.microsoft.com/office/drawing/2014/main" id="{474A7FC5-56F0-4FE3-8383-04EE92963F2A}"/>
               </a:ext>
               <a:ext uri="{C183D7F6-B498-43B3-948B-1728B52AA6E4}">
-                <adec:decorative xmlns:adec="http://schemas.microsoft.com/office/drawing/2017/decorative" xmlns="" val="1"/>
+                <adec:decorative xmlns:adec="http://schemas.microsoft.com/office/drawing/2017/decorative" val="1"/>
               </a:ext>
             </a:extLst>
           </p:cNvPr>
@@ -5529,7 +5560,7 @@
           <p:nvPr>
             <p:extLst>
               <p:ext uri="{386F3935-93C4-4BCD-93E2-E3B085C9AB24}">
-                <p16:designElem xmlns:p16="http://schemas.microsoft.com/office/powerpoint/2015/main" xmlns="" val="1"/>
+                <p16:designElem xmlns:p16="http://schemas.microsoft.com/office/powerpoint/2015/main" val="1"/>
               </p:ext>
             </p:extLst>
           </p:nvPr>
@@ -5576,7 +5607,7 @@
           <p:cNvPr id="5" name="Picture 4" descr="Working">
             <a:extLst>
               <a:ext uri="{FF2B5EF4-FFF2-40B4-BE49-F238E27FC236}">
-                <a16:creationId xmlns:a16="http://schemas.microsoft.com/office/drawing/2014/main" xmlns="" id="{BC829010-59E7-4B6E-AE76-EEE7D0ED0D81}"/>
+                <a16:creationId xmlns:a16="http://schemas.microsoft.com/office/drawing/2014/main" id="{BC829010-59E7-4B6E-AE76-EEE7D0ED0D81}"/>
               </a:ext>
             </a:extLst>
           </p:cNvPr>
@@ -5611,10 +5642,10 @@
           <p:cNvPr id="12" name="Rectangle 11">
             <a:extLst>
               <a:ext uri="{FF2B5EF4-FFF2-40B4-BE49-F238E27FC236}">
-                <a16:creationId xmlns:a16="http://schemas.microsoft.com/office/drawing/2014/main" xmlns="" id="{DE6BEBC3-6A99-4A53-9835-9875E08415A6}"/>
+                <a16:creationId xmlns:a16="http://schemas.microsoft.com/office/drawing/2014/main" id="{DE6BEBC3-6A99-4A53-9835-9875E08415A6}"/>
               </a:ext>
               <a:ext uri="{C183D7F6-B498-43B3-948B-1728B52AA6E4}">
-                <adec:decorative xmlns:adec="http://schemas.microsoft.com/office/drawing/2017/decorative" xmlns="" val="1"/>
+                <adec:decorative xmlns:adec="http://schemas.microsoft.com/office/drawing/2017/decorative" val="1"/>
               </a:ext>
             </a:extLst>
           </p:cNvPr>
@@ -5624,7 +5655,7 @@
           <p:nvPr>
             <p:extLst>
               <p:ext uri="{386F3935-93C4-4BCD-93E2-E3B085C9AB24}">
-                <p16:designElem xmlns:p16="http://schemas.microsoft.com/office/powerpoint/2015/main" xmlns="" val="1"/>
+                <p16:designElem xmlns:p16="http://schemas.microsoft.com/office/powerpoint/2015/main" val="1"/>
               </p:ext>
             </p:extLst>
           </p:nvPr>
@@ -5668,7 +5699,7 @@
           <p:cNvPr id="2" name="Title 1">
             <a:extLst>
               <a:ext uri="{FF2B5EF4-FFF2-40B4-BE49-F238E27FC236}">
-                <a16:creationId xmlns:a16="http://schemas.microsoft.com/office/drawing/2014/main" xmlns="" id="{F993299F-3E8A-4BF7-9C3D-B9F22CF94C4E}"/>
+                <a16:creationId xmlns:a16="http://schemas.microsoft.com/office/drawing/2014/main" id="{F993299F-3E8A-4BF7-9C3D-B9F22CF94C4E}"/>
               </a:ext>
             </a:extLst>
           </p:cNvPr>
@@ -5703,10 +5734,10 @@
           <p:cNvPr id="14" name="Rectangle 13">
             <a:extLst>
               <a:ext uri="{FF2B5EF4-FFF2-40B4-BE49-F238E27FC236}">
-                <a16:creationId xmlns:a16="http://schemas.microsoft.com/office/drawing/2014/main" xmlns="" id="{D1006911-EDB8-4CDF-AEAA-A3FA060851F3}"/>
+                <a16:creationId xmlns:a16="http://schemas.microsoft.com/office/drawing/2014/main" id="{D1006911-EDB8-4CDF-AEAA-A3FA060851F3}"/>
               </a:ext>
               <a:ext uri="{C183D7F6-B498-43B3-948B-1728B52AA6E4}">
-                <adec:decorative xmlns:adec="http://schemas.microsoft.com/office/drawing/2017/decorative" xmlns="" val="1"/>
+                <adec:decorative xmlns:adec="http://schemas.microsoft.com/office/drawing/2017/decorative" val="1"/>
               </a:ext>
             </a:extLst>
           </p:cNvPr>
@@ -5716,7 +5747,7 @@
           <p:nvPr>
             <p:extLst>
               <p:ext uri="{386F3935-93C4-4BCD-93E2-E3B085C9AB24}">
-                <p16:designElem xmlns:p16="http://schemas.microsoft.com/office/powerpoint/2015/main" xmlns="" val="1"/>
+                <p16:designElem xmlns:p16="http://schemas.microsoft.com/office/powerpoint/2015/main" val="1"/>
               </p:ext>
             </p:extLst>
           </p:nvPr>
@@ -6000,20 +6031,20 @@
 </file>
 
 <file path=customXml/item1.xml><?xml version="1.0" encoding="utf-8"?>
-<p:properties xmlns:p="http://schemas.microsoft.com/office/2006/metadata/properties" xmlns:xsi="http://www.w3.org/2001/XMLSchema-instance" xmlns:pc="http://schemas.microsoft.com/office/infopath/2007/PartnerControls">
-  <documentManagement>
-    <MediaServiceKeyPoints xmlns="71af3243-3dd4-4a8d-8c0d-dd76da1f02a5" xsi:nil="true"/>
-  </documentManagement>
-</p:properties>
-</file>
-
-<file path=customXml/item2.xml><?xml version="1.0" encoding="utf-8"?>
 <?mso-contentType ?>
 <FormTemplates xmlns="http://schemas.microsoft.com/sharepoint/v3/contenttype/forms">
   <Display>DocumentLibraryForm</Display>
   <Edit>DocumentLibraryForm</Edit>
   <New>DocumentLibraryForm</New>
 </FormTemplates>
+</file>
+
+<file path=customXml/item2.xml><?xml version="1.0" encoding="utf-8"?>
+<p:properties xmlns:p="http://schemas.microsoft.com/office/2006/metadata/properties" xmlns:xsi="http://www.w3.org/2001/XMLSchema-instance" xmlns:pc="http://schemas.microsoft.com/office/infopath/2007/PartnerControls">
+  <documentManagement>
+    <MediaServiceKeyPoints xmlns="71af3243-3dd4-4a8d-8c0d-dd76da1f02a5" xsi:nil="true"/>
+  </documentManagement>
+</p:properties>
 </file>
 
 <file path=customXml/item3.xml><?xml version="1.0" encoding="utf-8"?>
@@ -6228,6 +6259,14 @@
 </file>
 
 <file path=customXml/itemProps1.xml><?xml version="1.0" encoding="utf-8"?>
+<ds:datastoreItem xmlns:ds="http://schemas.openxmlformats.org/officeDocument/2006/customXml" ds:itemID="{DFB9BFA2-1FA5-44A1-B975-10D6BF58ECD0}">
+  <ds:schemaRefs>
+    <ds:schemaRef ds:uri="http://schemas.microsoft.com/sharepoint/v3/contenttype/forms"/>
+  </ds:schemaRefs>
+</ds:datastoreItem>
+</file>
+
+<file path=customXml/itemProps2.xml><?xml version="1.0" encoding="utf-8"?>
 <ds:datastoreItem xmlns:ds="http://schemas.openxmlformats.org/officeDocument/2006/customXml" ds:itemID="{30541854-87B3-4953-A183-EF3BD285377B}">
   <ds:schemaRefs>
     <ds:schemaRef ds:uri="http://schemas.openxmlformats.org/package/2006/metadata/core-properties"/>
@@ -6240,14 +6279,6 @@
     <ds:schemaRef ds:uri="http://purl.org/dc/terms/"/>
     <ds:schemaRef ds:uri="71af3243-3dd4-4a8d-8c0d-dd76da1f02a5"/>
     <ds:schemaRef ds:uri="http://www.w3.org/XML/1998/namespace"/>
-  </ds:schemaRefs>
-</ds:datastoreItem>
-</file>
-
-<file path=customXml/itemProps2.xml><?xml version="1.0" encoding="utf-8"?>
-<ds:datastoreItem xmlns:ds="http://schemas.openxmlformats.org/officeDocument/2006/customXml" ds:itemID="{DFB9BFA2-1FA5-44A1-B975-10D6BF58ECD0}">
-  <ds:schemaRefs>
-    <ds:schemaRef ds:uri="http://schemas.microsoft.com/sharepoint/v3/contenttype/forms"/>
   </ds:schemaRefs>
 </ds:datastoreItem>
 </file>

</xml_diff>